<commit_message>
Updates by sgiraldo @ 20191011 13:05 (more basic commands)
</commit_message>
<xml_diff>
--- a/Presentation1.pptx
+++ b/Presentation1.pptx
@@ -10,6 +10,9 @@
     <p:sldId id="260" r:id="rId4"/>
     <p:sldId id="261" r:id="rId5"/>
     <p:sldId id="262" r:id="rId6"/>
+    <p:sldId id="264" r:id="rId7"/>
+    <p:sldId id="263" r:id="rId8"/>
+    <p:sldId id="265" r:id="rId9"/>
   </p:sldIdLst>
   <p:sldSz cx="12192000" cy="6858000"/>
   <p:notesSz cx="6858000" cy="9144000"/>
@@ -108,6 +111,11 @@
       </a:defRPr>
     </a:lvl9pPr>
   </p:defaultTextStyle>
+  <p:extLst>
+    <p:ext uri="{EFAFB233-063F-42B5-8137-9DF3F51BA10A}">
+      <p15:sldGuideLst xmlns:p15="http://schemas.microsoft.com/office/powerpoint/2012/main"/>
+    </p:ext>
+  </p:extLst>
 </p:presentation>
 </file>
 
@@ -7640,6 +7648,3317 @@
 </p:sld>
 </file>
 
+<file path=ppt/slides/slide6.xml><?xml version="1.0" encoding="utf-8"?>
+<p:sld xmlns:a="http://schemas.openxmlformats.org/drawingml/2006/main" xmlns:r="http://schemas.openxmlformats.org/officeDocument/2006/relationships" xmlns:p="http://schemas.openxmlformats.org/presentationml/2006/main">
+  <p:cSld>
+    <p:spTree>
+      <p:nvGrpSpPr>
+        <p:cNvPr id="1" name=""/>
+        <p:cNvGrpSpPr/>
+        <p:nvPr/>
+      </p:nvGrpSpPr>
+      <p:grpSpPr>
+        <a:xfrm>
+          <a:off x="0" y="0"/>
+          <a:ext cx="0" cy="0"/>
+          <a:chOff x="0" y="0"/>
+          <a:chExt cx="0" cy="0"/>
+        </a:xfrm>
+      </p:grpSpPr>
+      <p:sp>
+        <p:nvSpPr>
+          <p:cNvPr id="30" name="Flowchart: Document 29">
+            <a:extLst>
+              <a:ext uri="{FF2B5EF4-FFF2-40B4-BE49-F238E27FC236}">
+                <a16:creationId xmlns:a16="http://schemas.microsoft.com/office/drawing/2014/main" id="{27A42941-7360-498F-899E-15C8EE29A963}"/>
+              </a:ext>
+            </a:extLst>
+          </p:cNvPr>
+          <p:cNvSpPr/>
+          <p:nvPr/>
+        </p:nvSpPr>
+        <p:spPr>
+          <a:xfrm>
+            <a:off x="813411" y="551150"/>
+            <a:ext cx="1189822" cy="612648"/>
+          </a:xfrm>
+          <a:prstGeom prst="flowChartDocument">
+            <a:avLst/>
+          </a:prstGeom>
+        </p:spPr>
+        <p:style>
+          <a:lnRef idx="2">
+            <a:schemeClr val="accent1">
+              <a:shade val="50000"/>
+            </a:schemeClr>
+          </a:lnRef>
+          <a:fillRef idx="1">
+            <a:schemeClr val="accent1"/>
+          </a:fillRef>
+          <a:effectRef idx="0">
+            <a:schemeClr val="accent1"/>
+          </a:effectRef>
+          <a:fontRef idx="minor">
+            <a:schemeClr val="lt1"/>
+          </a:fontRef>
+        </p:style>
+        <p:txBody>
+          <a:bodyPr rtlCol="0" anchor="ctr"/>
+          <a:lstStyle/>
+          <a:p>
+            <a:pPr algn="ctr"/>
+            <a:r>
+              <a:rPr lang="pt-BR" dirty="0">
+                <a:solidFill>
+                  <a:schemeClr val="tx1"/>
+                </a:solidFill>
+              </a:rPr>
+              <a:t>File1.txt</a:t>
+            </a:r>
+          </a:p>
+        </p:txBody>
+      </p:sp>
+      <p:sp>
+        <p:nvSpPr>
+          <p:cNvPr id="33" name="Flowchart: Document 32">
+            <a:extLst>
+              <a:ext uri="{FF2B5EF4-FFF2-40B4-BE49-F238E27FC236}">
+                <a16:creationId xmlns:a16="http://schemas.microsoft.com/office/drawing/2014/main" id="{DA127300-D428-4422-93A3-B1669BA15600}"/>
+              </a:ext>
+            </a:extLst>
+          </p:cNvPr>
+          <p:cNvSpPr/>
+          <p:nvPr/>
+        </p:nvSpPr>
+        <p:spPr>
+          <a:xfrm>
+            <a:off x="813411" y="1432502"/>
+            <a:ext cx="1189822" cy="612648"/>
+          </a:xfrm>
+          <a:prstGeom prst="flowChartDocument">
+            <a:avLst/>
+          </a:prstGeom>
+        </p:spPr>
+        <p:style>
+          <a:lnRef idx="2">
+            <a:schemeClr val="accent1">
+              <a:shade val="50000"/>
+            </a:schemeClr>
+          </a:lnRef>
+          <a:fillRef idx="1">
+            <a:schemeClr val="accent1"/>
+          </a:fillRef>
+          <a:effectRef idx="0">
+            <a:schemeClr val="accent1"/>
+          </a:effectRef>
+          <a:fontRef idx="minor">
+            <a:schemeClr val="lt1"/>
+          </a:fontRef>
+        </p:style>
+        <p:txBody>
+          <a:bodyPr rtlCol="0" anchor="ctr"/>
+          <a:lstStyle/>
+          <a:p>
+            <a:pPr algn="ctr"/>
+            <a:r>
+              <a:rPr lang="pt-BR" dirty="0">
+                <a:solidFill>
+                  <a:schemeClr val="tx1"/>
+                </a:solidFill>
+              </a:rPr>
+              <a:t>File2.txt</a:t>
+            </a:r>
+          </a:p>
+        </p:txBody>
+      </p:sp>
+      <p:sp>
+        <p:nvSpPr>
+          <p:cNvPr id="34" name="TextBox 33">
+            <a:extLst>
+              <a:ext uri="{FF2B5EF4-FFF2-40B4-BE49-F238E27FC236}">
+                <a16:creationId xmlns:a16="http://schemas.microsoft.com/office/drawing/2014/main" id="{A57D2F62-C7FD-4143-95DB-6741EF88EFEA}"/>
+              </a:ext>
+            </a:extLst>
+          </p:cNvPr>
+          <p:cNvSpPr txBox="1"/>
+          <p:nvPr/>
+        </p:nvSpPr>
+        <p:spPr>
+          <a:xfrm>
+            <a:off x="777733" y="2313854"/>
+            <a:ext cx="1205586" cy="369332"/>
+          </a:xfrm>
+          <a:prstGeom prst="rect">
+            <a:avLst/>
+          </a:prstGeom>
+          <a:noFill/>
+        </p:spPr>
+        <p:txBody>
+          <a:bodyPr wrap="none" rtlCol="0">
+            <a:spAutoFit/>
+          </a:bodyPr>
+          <a:lstStyle/>
+          <a:p>
+            <a:r>
+              <a:rPr lang="pt-BR" dirty="0"/>
+              <a:t>VISIONARY</a:t>
+            </a:r>
+          </a:p>
+        </p:txBody>
+      </p:sp>
+      <p:sp>
+        <p:nvSpPr>
+          <p:cNvPr id="35" name="TextBox 34">
+            <a:extLst>
+              <a:ext uri="{FF2B5EF4-FFF2-40B4-BE49-F238E27FC236}">
+                <a16:creationId xmlns:a16="http://schemas.microsoft.com/office/drawing/2014/main" id="{ED21A39D-49E8-4466-9652-9BF3F371C503}"/>
+              </a:ext>
+            </a:extLst>
+          </p:cNvPr>
+          <p:cNvSpPr txBox="1"/>
+          <p:nvPr/>
+        </p:nvSpPr>
+        <p:spPr>
+          <a:xfrm>
+            <a:off x="2860712" y="2313854"/>
+            <a:ext cx="917239" cy="369332"/>
+          </a:xfrm>
+          <a:prstGeom prst="rect">
+            <a:avLst/>
+          </a:prstGeom>
+          <a:noFill/>
+        </p:spPr>
+        <p:txBody>
+          <a:bodyPr wrap="none" rtlCol="0">
+            <a:spAutoFit/>
+          </a:bodyPr>
+          <a:lstStyle/>
+          <a:p>
+            <a:r>
+              <a:rPr lang="pt-BR" dirty="0"/>
+              <a:t>GITHUB</a:t>
+            </a:r>
+          </a:p>
+        </p:txBody>
+      </p:sp>
+      <p:cxnSp>
+        <p:nvCxnSpPr>
+          <p:cNvPr id="36" name="Straight Connector 35">
+            <a:extLst>
+              <a:ext uri="{FF2B5EF4-FFF2-40B4-BE49-F238E27FC236}">
+                <a16:creationId xmlns:a16="http://schemas.microsoft.com/office/drawing/2014/main" id="{E0B35E76-BCA7-415E-8E38-0B4EBEFE48ED}"/>
+              </a:ext>
+            </a:extLst>
+          </p:cNvPr>
+          <p:cNvCxnSpPr/>
+          <p:nvPr/>
+        </p:nvCxnSpPr>
+        <p:spPr>
+          <a:xfrm>
+            <a:off x="4504061" y="416803"/>
+            <a:ext cx="0" cy="2445744"/>
+          </a:xfrm>
+          <a:prstGeom prst="line">
+            <a:avLst/>
+          </a:prstGeom>
+          <a:ln w="34925">
+            <a:solidFill>
+              <a:schemeClr val="tx2"/>
+            </a:solidFill>
+          </a:ln>
+        </p:spPr>
+        <p:style>
+          <a:lnRef idx="1">
+            <a:schemeClr val="accent1"/>
+          </a:lnRef>
+          <a:fillRef idx="0">
+            <a:schemeClr val="accent1"/>
+          </a:fillRef>
+          <a:effectRef idx="0">
+            <a:schemeClr val="accent1"/>
+          </a:effectRef>
+          <a:fontRef idx="minor">
+            <a:schemeClr val="tx1"/>
+          </a:fontRef>
+        </p:style>
+      </p:cxnSp>
+      <p:sp>
+        <p:nvSpPr>
+          <p:cNvPr id="37" name="Rectangle: Rounded Corners 36">
+            <a:extLst>
+              <a:ext uri="{FF2B5EF4-FFF2-40B4-BE49-F238E27FC236}">
+                <a16:creationId xmlns:a16="http://schemas.microsoft.com/office/drawing/2014/main" id="{FBA4F5D3-8987-4446-B95A-DC10E42DEE2A}"/>
+              </a:ext>
+            </a:extLst>
+          </p:cNvPr>
+          <p:cNvSpPr/>
+          <p:nvPr/>
+        </p:nvSpPr>
+        <p:spPr>
+          <a:xfrm>
+            <a:off x="8495834" y="551150"/>
+            <a:ext cx="1454226" cy="826265"/>
+          </a:xfrm>
+          <a:prstGeom prst="roundRect">
+            <a:avLst/>
+          </a:prstGeom>
+        </p:spPr>
+        <p:style>
+          <a:lnRef idx="2">
+            <a:schemeClr val="accent1">
+              <a:shade val="50000"/>
+            </a:schemeClr>
+          </a:lnRef>
+          <a:fillRef idx="1">
+            <a:schemeClr val="accent1"/>
+          </a:fillRef>
+          <a:effectRef idx="0">
+            <a:schemeClr val="accent1"/>
+          </a:effectRef>
+          <a:fontRef idx="minor">
+            <a:schemeClr val="lt1"/>
+          </a:fontRef>
+        </p:style>
+        <p:txBody>
+          <a:bodyPr rtlCol="0" anchor="ctr"/>
+          <a:lstStyle/>
+          <a:p>
+            <a:pPr algn="ctr"/>
+            <a:r>
+              <a:rPr lang="pt-BR" dirty="0">
+                <a:solidFill>
+                  <a:schemeClr val="tx1"/>
+                </a:solidFill>
+              </a:rPr>
+              <a:t>MASTER</a:t>
+            </a:r>
+          </a:p>
+        </p:txBody>
+      </p:sp>
+      <p:sp>
+        <p:nvSpPr>
+          <p:cNvPr id="38" name="Rectangle: Rounded Corners 37">
+            <a:extLst>
+              <a:ext uri="{FF2B5EF4-FFF2-40B4-BE49-F238E27FC236}">
+                <a16:creationId xmlns:a16="http://schemas.microsoft.com/office/drawing/2014/main" id="{810B104A-B2C2-4A89-B692-FFA2239283C8}"/>
+              </a:ext>
+            </a:extLst>
+          </p:cNvPr>
+          <p:cNvSpPr/>
+          <p:nvPr/>
+        </p:nvSpPr>
+        <p:spPr>
+          <a:xfrm>
+            <a:off x="8495834" y="2333579"/>
+            <a:ext cx="1454226" cy="826265"/>
+          </a:xfrm>
+          <a:prstGeom prst="roundRect">
+            <a:avLst/>
+          </a:prstGeom>
+        </p:spPr>
+        <p:style>
+          <a:lnRef idx="2">
+            <a:schemeClr val="accent1">
+              <a:shade val="50000"/>
+            </a:schemeClr>
+          </a:lnRef>
+          <a:fillRef idx="1">
+            <a:schemeClr val="accent1"/>
+          </a:fillRef>
+          <a:effectRef idx="0">
+            <a:schemeClr val="accent1"/>
+          </a:effectRef>
+          <a:fontRef idx="minor">
+            <a:schemeClr val="lt1"/>
+          </a:fontRef>
+        </p:style>
+        <p:txBody>
+          <a:bodyPr rtlCol="0" anchor="ctr"/>
+          <a:lstStyle/>
+          <a:p>
+            <a:pPr algn="ctr"/>
+            <a:r>
+              <a:rPr lang="pt-BR" dirty="0">
+                <a:solidFill>
+                  <a:schemeClr val="tx1"/>
+                </a:solidFill>
+              </a:rPr>
+              <a:t>ORIGIN/</a:t>
+            </a:r>
+            <a:br>
+              <a:rPr lang="pt-BR" dirty="0">
+                <a:solidFill>
+                  <a:schemeClr val="tx1"/>
+                </a:solidFill>
+              </a:rPr>
+            </a:br>
+            <a:r>
+              <a:rPr lang="pt-BR" dirty="0">
+                <a:solidFill>
+                  <a:schemeClr val="tx1"/>
+                </a:solidFill>
+              </a:rPr>
+              <a:t>MASTER</a:t>
+            </a:r>
+          </a:p>
+        </p:txBody>
+      </p:sp>
+      <p:sp>
+        <p:nvSpPr>
+          <p:cNvPr id="39" name="Flowchart: Punched Tape 38">
+            <a:extLst>
+              <a:ext uri="{FF2B5EF4-FFF2-40B4-BE49-F238E27FC236}">
+                <a16:creationId xmlns:a16="http://schemas.microsoft.com/office/drawing/2014/main" id="{CFF1CB06-0515-4316-B7AC-BE2ADA3ED3FA}"/>
+              </a:ext>
+            </a:extLst>
+          </p:cNvPr>
+          <p:cNvSpPr/>
+          <p:nvPr/>
+        </p:nvSpPr>
+        <p:spPr>
+          <a:xfrm>
+            <a:off x="10497241" y="3629579"/>
+            <a:ext cx="1454226" cy="826265"/>
+          </a:xfrm>
+          <a:prstGeom prst="flowChartPunchedTape">
+            <a:avLst/>
+          </a:prstGeom>
+        </p:spPr>
+        <p:style>
+          <a:lnRef idx="2">
+            <a:schemeClr val="accent1">
+              <a:shade val="50000"/>
+            </a:schemeClr>
+          </a:lnRef>
+          <a:fillRef idx="1">
+            <a:schemeClr val="accent1"/>
+          </a:fillRef>
+          <a:effectRef idx="0">
+            <a:schemeClr val="accent1"/>
+          </a:effectRef>
+          <a:fontRef idx="minor">
+            <a:schemeClr val="lt1"/>
+          </a:fontRef>
+        </p:style>
+        <p:txBody>
+          <a:bodyPr rtlCol="0" anchor="ctr"/>
+          <a:lstStyle/>
+          <a:p>
+            <a:pPr algn="ctr"/>
+            <a:r>
+              <a:rPr lang="pt-BR" dirty="0">
+                <a:solidFill>
+                  <a:schemeClr val="tx1"/>
+                </a:solidFill>
+              </a:rPr>
+              <a:t>HEAD</a:t>
+            </a:r>
+          </a:p>
+        </p:txBody>
+      </p:sp>
+      <p:cxnSp>
+        <p:nvCxnSpPr>
+          <p:cNvPr id="40" name="Straight Arrow Connector 39">
+            <a:extLst>
+              <a:ext uri="{FF2B5EF4-FFF2-40B4-BE49-F238E27FC236}">
+                <a16:creationId xmlns:a16="http://schemas.microsoft.com/office/drawing/2014/main" id="{F449FB8C-5E27-4E5F-ABAD-965B5DF69742}"/>
+              </a:ext>
+            </a:extLst>
+          </p:cNvPr>
+          <p:cNvCxnSpPr>
+            <a:cxnSpLocks/>
+            <a:stCxn id="39" idx="1"/>
+            <a:endCxn id="43" idx="3"/>
+          </p:cNvCxnSpPr>
+          <p:nvPr/>
+        </p:nvCxnSpPr>
+        <p:spPr>
+          <a:xfrm flipH="1">
+            <a:off x="9950060" y="4042712"/>
+            <a:ext cx="547181" cy="1"/>
+          </a:xfrm>
+          <a:prstGeom prst="straightConnector1">
+            <a:avLst/>
+          </a:prstGeom>
+          <a:ln>
+            <a:tailEnd type="triangle"/>
+          </a:ln>
+        </p:spPr>
+        <p:style>
+          <a:lnRef idx="1">
+            <a:schemeClr val="accent1"/>
+          </a:lnRef>
+          <a:fillRef idx="0">
+            <a:schemeClr val="accent1"/>
+          </a:fillRef>
+          <a:effectRef idx="0">
+            <a:schemeClr val="accent1"/>
+          </a:effectRef>
+          <a:fontRef idx="minor">
+            <a:schemeClr val="tx1"/>
+          </a:fontRef>
+        </p:style>
+      </p:cxnSp>
+      <p:sp>
+        <p:nvSpPr>
+          <p:cNvPr id="42" name="Oval 41">
+            <a:extLst>
+              <a:ext uri="{FF2B5EF4-FFF2-40B4-BE49-F238E27FC236}">
+                <a16:creationId xmlns:a16="http://schemas.microsoft.com/office/drawing/2014/main" id="{EC0A4FE6-5057-4CE8-97CD-1A99A8754C8F}"/>
+              </a:ext>
+            </a:extLst>
+          </p:cNvPr>
+          <p:cNvSpPr/>
+          <p:nvPr/>
+        </p:nvSpPr>
+        <p:spPr>
+          <a:xfrm>
+            <a:off x="4674228" y="1037421"/>
+            <a:ext cx="1553378" cy="1134738"/>
+          </a:xfrm>
+          <a:prstGeom prst="ellipse">
+            <a:avLst/>
+          </a:prstGeom>
+        </p:spPr>
+        <p:style>
+          <a:lnRef idx="2">
+            <a:schemeClr val="accent1">
+              <a:shade val="50000"/>
+            </a:schemeClr>
+          </a:lnRef>
+          <a:fillRef idx="1">
+            <a:schemeClr val="accent1"/>
+          </a:fillRef>
+          <a:effectRef idx="0">
+            <a:schemeClr val="accent1"/>
+          </a:effectRef>
+          <a:fontRef idx="minor">
+            <a:schemeClr val="lt1"/>
+          </a:fontRef>
+        </p:style>
+        <p:txBody>
+          <a:bodyPr rtlCol="0" anchor="ctr"/>
+          <a:lstStyle/>
+          <a:p>
+            <a:pPr algn="ctr"/>
+            <a:r>
+              <a:rPr lang="pt-BR" dirty="0">
+                <a:solidFill>
+                  <a:schemeClr val="tx1"/>
+                </a:solidFill>
+              </a:rPr>
+              <a:t>93230ca</a:t>
+            </a:r>
+          </a:p>
+        </p:txBody>
+      </p:sp>
+      <p:sp>
+        <p:nvSpPr>
+          <p:cNvPr id="44" name="Flowchart: Document 43">
+            <a:extLst>
+              <a:ext uri="{FF2B5EF4-FFF2-40B4-BE49-F238E27FC236}">
+                <a16:creationId xmlns:a16="http://schemas.microsoft.com/office/drawing/2014/main" id="{E3DA4424-9147-491D-AA46-3D39D2C015AB}"/>
+              </a:ext>
+            </a:extLst>
+          </p:cNvPr>
+          <p:cNvSpPr/>
+          <p:nvPr/>
+        </p:nvSpPr>
+        <p:spPr>
+          <a:xfrm>
+            <a:off x="2836851" y="551150"/>
+            <a:ext cx="1189822" cy="612648"/>
+          </a:xfrm>
+          <a:prstGeom prst="flowChartDocument">
+            <a:avLst/>
+          </a:prstGeom>
+        </p:spPr>
+        <p:style>
+          <a:lnRef idx="2">
+            <a:schemeClr val="accent1">
+              <a:shade val="50000"/>
+            </a:schemeClr>
+          </a:lnRef>
+          <a:fillRef idx="1">
+            <a:schemeClr val="accent1"/>
+          </a:fillRef>
+          <a:effectRef idx="0">
+            <a:schemeClr val="accent1"/>
+          </a:effectRef>
+          <a:fontRef idx="minor">
+            <a:schemeClr val="lt1"/>
+          </a:fontRef>
+        </p:style>
+        <p:txBody>
+          <a:bodyPr rtlCol="0" anchor="ctr"/>
+          <a:lstStyle/>
+          <a:p>
+            <a:pPr algn="ctr"/>
+            <a:r>
+              <a:rPr lang="pt-BR" dirty="0">
+                <a:solidFill>
+                  <a:schemeClr val="tx1"/>
+                </a:solidFill>
+              </a:rPr>
+              <a:t>File1.txt</a:t>
+            </a:r>
+          </a:p>
+        </p:txBody>
+      </p:sp>
+      <p:sp>
+        <p:nvSpPr>
+          <p:cNvPr id="45" name="Flowchart: Document 44">
+            <a:extLst>
+              <a:ext uri="{FF2B5EF4-FFF2-40B4-BE49-F238E27FC236}">
+                <a16:creationId xmlns:a16="http://schemas.microsoft.com/office/drawing/2014/main" id="{FA177F2C-91C0-411D-857C-43EC0C733530}"/>
+              </a:ext>
+            </a:extLst>
+          </p:cNvPr>
+          <p:cNvSpPr/>
+          <p:nvPr/>
+        </p:nvSpPr>
+        <p:spPr>
+          <a:xfrm>
+            <a:off x="2836851" y="1432502"/>
+            <a:ext cx="1189822" cy="612648"/>
+          </a:xfrm>
+          <a:prstGeom prst="flowChartDocument">
+            <a:avLst/>
+          </a:prstGeom>
+        </p:spPr>
+        <p:style>
+          <a:lnRef idx="2">
+            <a:schemeClr val="accent1">
+              <a:shade val="50000"/>
+            </a:schemeClr>
+          </a:lnRef>
+          <a:fillRef idx="1">
+            <a:schemeClr val="accent1"/>
+          </a:fillRef>
+          <a:effectRef idx="0">
+            <a:schemeClr val="accent1"/>
+          </a:effectRef>
+          <a:fontRef idx="minor">
+            <a:schemeClr val="lt1"/>
+          </a:fontRef>
+        </p:style>
+        <p:txBody>
+          <a:bodyPr rtlCol="0" anchor="ctr"/>
+          <a:lstStyle/>
+          <a:p>
+            <a:pPr algn="ctr"/>
+            <a:r>
+              <a:rPr lang="pt-BR" dirty="0">
+                <a:solidFill>
+                  <a:schemeClr val="tx1"/>
+                </a:solidFill>
+              </a:rPr>
+              <a:t>File2.txt</a:t>
+            </a:r>
+          </a:p>
+        </p:txBody>
+      </p:sp>
+      <p:sp>
+        <p:nvSpPr>
+          <p:cNvPr id="46" name="Oval 45">
+            <a:extLst>
+              <a:ext uri="{FF2B5EF4-FFF2-40B4-BE49-F238E27FC236}">
+                <a16:creationId xmlns:a16="http://schemas.microsoft.com/office/drawing/2014/main" id="{72B9499B-C4AF-4ABB-B820-43FFB4A0775C}"/>
+              </a:ext>
+            </a:extLst>
+          </p:cNvPr>
+          <p:cNvSpPr/>
+          <p:nvPr/>
+        </p:nvSpPr>
+        <p:spPr>
+          <a:xfrm>
+            <a:off x="6595445" y="1037421"/>
+            <a:ext cx="1553378" cy="1134738"/>
+          </a:xfrm>
+          <a:prstGeom prst="ellipse">
+            <a:avLst/>
+          </a:prstGeom>
+        </p:spPr>
+        <p:style>
+          <a:lnRef idx="2">
+            <a:schemeClr val="accent1">
+              <a:shade val="50000"/>
+            </a:schemeClr>
+          </a:lnRef>
+          <a:fillRef idx="1">
+            <a:schemeClr val="accent1"/>
+          </a:fillRef>
+          <a:effectRef idx="0">
+            <a:schemeClr val="accent1"/>
+          </a:effectRef>
+          <a:fontRef idx="minor">
+            <a:schemeClr val="lt1"/>
+          </a:fontRef>
+        </p:style>
+        <p:txBody>
+          <a:bodyPr rtlCol="0" anchor="ctr"/>
+          <a:lstStyle/>
+          <a:p>
+            <a:pPr algn="ctr"/>
+            <a:r>
+              <a:rPr lang="pt-BR" dirty="0">
+                <a:solidFill>
+                  <a:schemeClr val="tx1"/>
+                </a:solidFill>
+              </a:rPr>
+              <a:t>0bd7901</a:t>
+            </a:r>
+          </a:p>
+        </p:txBody>
+      </p:sp>
+      <p:cxnSp>
+        <p:nvCxnSpPr>
+          <p:cNvPr id="9" name="Straight Arrow Connector 8">
+            <a:extLst>
+              <a:ext uri="{FF2B5EF4-FFF2-40B4-BE49-F238E27FC236}">
+                <a16:creationId xmlns:a16="http://schemas.microsoft.com/office/drawing/2014/main" id="{86B46F3F-6B76-425F-8D2A-CDDEC4BB6471}"/>
+              </a:ext>
+            </a:extLst>
+          </p:cNvPr>
+          <p:cNvCxnSpPr>
+            <a:stCxn id="46" idx="2"/>
+            <a:endCxn id="42" idx="6"/>
+          </p:cNvCxnSpPr>
+          <p:nvPr/>
+        </p:nvCxnSpPr>
+        <p:spPr>
+          <a:xfrm flipH="1">
+            <a:off x="6227606" y="1604790"/>
+            <a:ext cx="367839" cy="0"/>
+          </a:xfrm>
+          <a:prstGeom prst="straightConnector1">
+            <a:avLst/>
+          </a:prstGeom>
+          <a:ln>
+            <a:tailEnd type="triangle"/>
+          </a:ln>
+        </p:spPr>
+        <p:style>
+          <a:lnRef idx="1">
+            <a:schemeClr val="accent1"/>
+          </a:lnRef>
+          <a:fillRef idx="0">
+            <a:schemeClr val="accent1"/>
+          </a:fillRef>
+          <a:effectRef idx="0">
+            <a:schemeClr val="accent1"/>
+          </a:effectRef>
+          <a:fontRef idx="minor">
+            <a:schemeClr val="tx1"/>
+          </a:fontRef>
+        </p:style>
+      </p:cxnSp>
+      <p:cxnSp>
+        <p:nvCxnSpPr>
+          <p:cNvPr id="47" name="Straight Arrow Connector 46">
+            <a:extLst>
+              <a:ext uri="{FF2B5EF4-FFF2-40B4-BE49-F238E27FC236}">
+                <a16:creationId xmlns:a16="http://schemas.microsoft.com/office/drawing/2014/main" id="{6590E505-0548-487B-95B7-5A5AF54E44BB}"/>
+              </a:ext>
+            </a:extLst>
+          </p:cNvPr>
+          <p:cNvCxnSpPr>
+            <a:cxnSpLocks/>
+            <a:stCxn id="38" idx="1"/>
+            <a:endCxn id="46" idx="5"/>
+          </p:cNvCxnSpPr>
+          <p:nvPr/>
+        </p:nvCxnSpPr>
+        <p:spPr>
+          <a:xfrm flipH="1" flipV="1">
+            <a:off x="7921336" y="2005980"/>
+            <a:ext cx="574498" cy="740732"/>
+          </a:xfrm>
+          <a:prstGeom prst="straightConnector1">
+            <a:avLst/>
+          </a:prstGeom>
+          <a:ln>
+            <a:tailEnd type="triangle"/>
+          </a:ln>
+        </p:spPr>
+        <p:style>
+          <a:lnRef idx="1">
+            <a:schemeClr val="accent1"/>
+          </a:lnRef>
+          <a:fillRef idx="0">
+            <a:schemeClr val="accent1"/>
+          </a:fillRef>
+          <a:effectRef idx="0">
+            <a:schemeClr val="accent1"/>
+          </a:effectRef>
+          <a:fontRef idx="minor">
+            <a:schemeClr val="tx1"/>
+          </a:fontRef>
+        </p:style>
+      </p:cxnSp>
+      <p:cxnSp>
+        <p:nvCxnSpPr>
+          <p:cNvPr id="49" name="Straight Arrow Connector 48">
+            <a:extLst>
+              <a:ext uri="{FF2B5EF4-FFF2-40B4-BE49-F238E27FC236}">
+                <a16:creationId xmlns:a16="http://schemas.microsoft.com/office/drawing/2014/main" id="{2D4CBAC1-C287-410B-AE85-EB9997A23AC1}"/>
+              </a:ext>
+            </a:extLst>
+          </p:cNvPr>
+          <p:cNvCxnSpPr>
+            <a:stCxn id="37" idx="1"/>
+            <a:endCxn id="46" idx="7"/>
+          </p:cNvCxnSpPr>
+          <p:nvPr/>
+        </p:nvCxnSpPr>
+        <p:spPr>
+          <a:xfrm flipH="1">
+            <a:off x="7921336" y="964283"/>
+            <a:ext cx="574498" cy="239317"/>
+          </a:xfrm>
+          <a:prstGeom prst="straightConnector1">
+            <a:avLst/>
+          </a:prstGeom>
+          <a:ln>
+            <a:tailEnd type="triangle"/>
+          </a:ln>
+        </p:spPr>
+        <p:style>
+          <a:lnRef idx="1">
+            <a:schemeClr val="accent1"/>
+          </a:lnRef>
+          <a:fillRef idx="0">
+            <a:schemeClr val="accent1"/>
+          </a:fillRef>
+          <a:effectRef idx="0">
+            <a:schemeClr val="accent1"/>
+          </a:effectRef>
+          <a:fontRef idx="minor">
+            <a:schemeClr val="tx1"/>
+          </a:fontRef>
+        </p:style>
+      </p:cxnSp>
+      <p:sp>
+        <p:nvSpPr>
+          <p:cNvPr id="43" name="Rectangle: Rounded Corners 42">
+            <a:extLst>
+              <a:ext uri="{FF2B5EF4-FFF2-40B4-BE49-F238E27FC236}">
+                <a16:creationId xmlns:a16="http://schemas.microsoft.com/office/drawing/2014/main" id="{7DB7A850-A5EB-48FA-B16F-293758E65113}"/>
+              </a:ext>
+            </a:extLst>
+          </p:cNvPr>
+          <p:cNvSpPr/>
+          <p:nvPr/>
+        </p:nvSpPr>
+        <p:spPr>
+          <a:xfrm>
+            <a:off x="8495834" y="3629580"/>
+            <a:ext cx="1454226" cy="826265"/>
+          </a:xfrm>
+          <a:prstGeom prst="roundRect">
+            <a:avLst/>
+          </a:prstGeom>
+        </p:spPr>
+        <p:style>
+          <a:lnRef idx="2">
+            <a:schemeClr val="accent1">
+              <a:shade val="50000"/>
+            </a:schemeClr>
+          </a:lnRef>
+          <a:fillRef idx="1">
+            <a:schemeClr val="accent1"/>
+          </a:fillRef>
+          <a:effectRef idx="0">
+            <a:schemeClr val="accent1"/>
+          </a:effectRef>
+          <a:fontRef idx="minor">
+            <a:schemeClr val="lt1"/>
+          </a:fontRef>
+        </p:style>
+        <p:txBody>
+          <a:bodyPr rtlCol="0" anchor="ctr"/>
+          <a:lstStyle/>
+          <a:p>
+            <a:pPr algn="ctr"/>
+            <a:r>
+              <a:rPr lang="pt-BR" dirty="0">
+                <a:solidFill>
+                  <a:schemeClr val="tx1"/>
+                </a:solidFill>
+              </a:rPr>
+              <a:t>COOL</a:t>
+            </a:r>
+          </a:p>
+        </p:txBody>
+      </p:sp>
+      <p:cxnSp>
+        <p:nvCxnSpPr>
+          <p:cNvPr id="3" name="Straight Arrow Connector 2">
+            <a:extLst>
+              <a:ext uri="{FF2B5EF4-FFF2-40B4-BE49-F238E27FC236}">
+                <a16:creationId xmlns:a16="http://schemas.microsoft.com/office/drawing/2014/main" id="{E3CD74D0-37B5-4F79-B3DE-5FE0E352C612}"/>
+              </a:ext>
+            </a:extLst>
+          </p:cNvPr>
+          <p:cNvCxnSpPr>
+            <a:cxnSpLocks/>
+            <a:stCxn id="43" idx="1"/>
+            <a:endCxn id="46" idx="4"/>
+          </p:cNvCxnSpPr>
+          <p:nvPr/>
+        </p:nvCxnSpPr>
+        <p:spPr>
+          <a:xfrm flipH="1" flipV="1">
+            <a:off x="7372134" y="2172159"/>
+            <a:ext cx="1123700" cy="1870554"/>
+          </a:xfrm>
+          <a:prstGeom prst="straightConnector1">
+            <a:avLst/>
+          </a:prstGeom>
+          <a:ln>
+            <a:tailEnd type="triangle"/>
+          </a:ln>
+        </p:spPr>
+        <p:style>
+          <a:lnRef idx="1">
+            <a:schemeClr val="accent1"/>
+          </a:lnRef>
+          <a:fillRef idx="0">
+            <a:schemeClr val="accent1"/>
+          </a:fillRef>
+          <a:effectRef idx="0">
+            <a:schemeClr val="accent1"/>
+          </a:effectRef>
+          <a:fontRef idx="minor">
+            <a:schemeClr val="tx1"/>
+          </a:fontRef>
+        </p:style>
+      </p:cxnSp>
+    </p:spTree>
+    <p:extLst>
+      <p:ext uri="{BB962C8B-B14F-4D97-AF65-F5344CB8AC3E}">
+        <p14:creationId xmlns:p14="http://schemas.microsoft.com/office/powerpoint/2010/main" val="1100721230"/>
+      </p:ext>
+    </p:extLst>
+  </p:cSld>
+  <p:clrMapOvr>
+    <a:masterClrMapping/>
+  </p:clrMapOvr>
+</p:sld>
+</file>
+
+<file path=ppt/slides/slide7.xml><?xml version="1.0" encoding="utf-8"?>
+<p:sld xmlns:a="http://schemas.openxmlformats.org/drawingml/2006/main" xmlns:r="http://schemas.openxmlformats.org/officeDocument/2006/relationships" xmlns:p="http://schemas.openxmlformats.org/presentationml/2006/main">
+  <p:cSld>
+    <p:spTree>
+      <p:nvGrpSpPr>
+        <p:cNvPr id="1" name=""/>
+        <p:cNvGrpSpPr/>
+        <p:nvPr/>
+      </p:nvGrpSpPr>
+      <p:grpSpPr>
+        <a:xfrm>
+          <a:off x="0" y="0"/>
+          <a:ext cx="0" cy="0"/>
+          <a:chOff x="0" y="0"/>
+          <a:chExt cx="0" cy="0"/>
+        </a:xfrm>
+      </p:grpSpPr>
+      <p:sp>
+        <p:nvSpPr>
+          <p:cNvPr id="30" name="Flowchart: Document 29">
+            <a:extLst>
+              <a:ext uri="{FF2B5EF4-FFF2-40B4-BE49-F238E27FC236}">
+                <a16:creationId xmlns:a16="http://schemas.microsoft.com/office/drawing/2014/main" id="{27A42941-7360-498F-899E-15C8EE29A963}"/>
+              </a:ext>
+            </a:extLst>
+          </p:cNvPr>
+          <p:cNvSpPr/>
+          <p:nvPr/>
+        </p:nvSpPr>
+        <p:spPr>
+          <a:xfrm>
+            <a:off x="813411" y="551150"/>
+            <a:ext cx="1189822" cy="612648"/>
+          </a:xfrm>
+          <a:prstGeom prst="flowChartDocument">
+            <a:avLst/>
+          </a:prstGeom>
+        </p:spPr>
+        <p:style>
+          <a:lnRef idx="2">
+            <a:schemeClr val="accent1">
+              <a:shade val="50000"/>
+            </a:schemeClr>
+          </a:lnRef>
+          <a:fillRef idx="1">
+            <a:schemeClr val="accent1"/>
+          </a:fillRef>
+          <a:effectRef idx="0">
+            <a:schemeClr val="accent1"/>
+          </a:effectRef>
+          <a:fontRef idx="minor">
+            <a:schemeClr val="lt1"/>
+          </a:fontRef>
+        </p:style>
+        <p:txBody>
+          <a:bodyPr rtlCol="0" anchor="ctr"/>
+          <a:lstStyle/>
+          <a:p>
+            <a:pPr algn="ctr"/>
+            <a:r>
+              <a:rPr lang="pt-BR" dirty="0">
+                <a:solidFill>
+                  <a:schemeClr val="tx1"/>
+                </a:solidFill>
+              </a:rPr>
+              <a:t>File1.txt</a:t>
+            </a:r>
+          </a:p>
+        </p:txBody>
+      </p:sp>
+      <p:sp>
+        <p:nvSpPr>
+          <p:cNvPr id="33" name="Flowchart: Document 32">
+            <a:extLst>
+              <a:ext uri="{FF2B5EF4-FFF2-40B4-BE49-F238E27FC236}">
+                <a16:creationId xmlns:a16="http://schemas.microsoft.com/office/drawing/2014/main" id="{DA127300-D428-4422-93A3-B1669BA15600}"/>
+              </a:ext>
+            </a:extLst>
+          </p:cNvPr>
+          <p:cNvSpPr/>
+          <p:nvPr/>
+        </p:nvSpPr>
+        <p:spPr>
+          <a:xfrm>
+            <a:off x="813411" y="1432502"/>
+            <a:ext cx="1189822" cy="612648"/>
+          </a:xfrm>
+          <a:prstGeom prst="flowChartDocument">
+            <a:avLst/>
+          </a:prstGeom>
+        </p:spPr>
+        <p:style>
+          <a:lnRef idx="2">
+            <a:schemeClr val="accent1">
+              <a:shade val="50000"/>
+            </a:schemeClr>
+          </a:lnRef>
+          <a:fillRef idx="1">
+            <a:schemeClr val="accent1"/>
+          </a:fillRef>
+          <a:effectRef idx="0">
+            <a:schemeClr val="accent1"/>
+          </a:effectRef>
+          <a:fontRef idx="minor">
+            <a:schemeClr val="lt1"/>
+          </a:fontRef>
+        </p:style>
+        <p:txBody>
+          <a:bodyPr rtlCol="0" anchor="ctr"/>
+          <a:lstStyle/>
+          <a:p>
+            <a:pPr algn="ctr"/>
+            <a:r>
+              <a:rPr lang="pt-BR" dirty="0">
+                <a:solidFill>
+                  <a:schemeClr val="tx1"/>
+                </a:solidFill>
+              </a:rPr>
+              <a:t>File2.txt</a:t>
+            </a:r>
+          </a:p>
+        </p:txBody>
+      </p:sp>
+      <p:sp>
+        <p:nvSpPr>
+          <p:cNvPr id="34" name="TextBox 33">
+            <a:extLst>
+              <a:ext uri="{FF2B5EF4-FFF2-40B4-BE49-F238E27FC236}">
+                <a16:creationId xmlns:a16="http://schemas.microsoft.com/office/drawing/2014/main" id="{A57D2F62-C7FD-4143-95DB-6741EF88EFEA}"/>
+              </a:ext>
+            </a:extLst>
+          </p:cNvPr>
+          <p:cNvSpPr txBox="1"/>
+          <p:nvPr/>
+        </p:nvSpPr>
+        <p:spPr>
+          <a:xfrm>
+            <a:off x="797647" y="3117341"/>
+            <a:ext cx="1205586" cy="369332"/>
+          </a:xfrm>
+          <a:prstGeom prst="rect">
+            <a:avLst/>
+          </a:prstGeom>
+          <a:noFill/>
+        </p:spPr>
+        <p:txBody>
+          <a:bodyPr wrap="none" rtlCol="0">
+            <a:spAutoFit/>
+          </a:bodyPr>
+          <a:lstStyle/>
+          <a:p>
+            <a:r>
+              <a:rPr lang="pt-BR" dirty="0"/>
+              <a:t>VISIONARY</a:t>
+            </a:r>
+          </a:p>
+        </p:txBody>
+      </p:sp>
+      <p:sp>
+        <p:nvSpPr>
+          <p:cNvPr id="35" name="TextBox 34">
+            <a:extLst>
+              <a:ext uri="{FF2B5EF4-FFF2-40B4-BE49-F238E27FC236}">
+                <a16:creationId xmlns:a16="http://schemas.microsoft.com/office/drawing/2014/main" id="{ED21A39D-49E8-4466-9652-9BF3F371C503}"/>
+              </a:ext>
+            </a:extLst>
+          </p:cNvPr>
+          <p:cNvSpPr txBox="1"/>
+          <p:nvPr/>
+        </p:nvSpPr>
+        <p:spPr>
+          <a:xfrm>
+            <a:off x="2860712" y="2313854"/>
+            <a:ext cx="917239" cy="369332"/>
+          </a:xfrm>
+          <a:prstGeom prst="rect">
+            <a:avLst/>
+          </a:prstGeom>
+          <a:noFill/>
+        </p:spPr>
+        <p:txBody>
+          <a:bodyPr wrap="none" rtlCol="0">
+            <a:spAutoFit/>
+          </a:bodyPr>
+          <a:lstStyle/>
+          <a:p>
+            <a:r>
+              <a:rPr lang="pt-BR" dirty="0"/>
+              <a:t>GITHUB</a:t>
+            </a:r>
+          </a:p>
+        </p:txBody>
+      </p:sp>
+      <p:cxnSp>
+        <p:nvCxnSpPr>
+          <p:cNvPr id="36" name="Straight Connector 35">
+            <a:extLst>
+              <a:ext uri="{FF2B5EF4-FFF2-40B4-BE49-F238E27FC236}">
+                <a16:creationId xmlns:a16="http://schemas.microsoft.com/office/drawing/2014/main" id="{E0B35E76-BCA7-415E-8E38-0B4EBEFE48ED}"/>
+              </a:ext>
+            </a:extLst>
+          </p:cNvPr>
+          <p:cNvCxnSpPr/>
+          <p:nvPr/>
+        </p:nvCxnSpPr>
+        <p:spPr>
+          <a:xfrm>
+            <a:off x="4504061" y="416803"/>
+            <a:ext cx="0" cy="2445744"/>
+          </a:xfrm>
+          <a:prstGeom prst="line">
+            <a:avLst/>
+          </a:prstGeom>
+          <a:ln w="34925">
+            <a:solidFill>
+              <a:schemeClr val="tx2"/>
+            </a:solidFill>
+          </a:ln>
+        </p:spPr>
+        <p:style>
+          <a:lnRef idx="1">
+            <a:schemeClr val="accent1"/>
+          </a:lnRef>
+          <a:fillRef idx="0">
+            <a:schemeClr val="accent1"/>
+          </a:fillRef>
+          <a:effectRef idx="0">
+            <a:schemeClr val="accent1"/>
+          </a:effectRef>
+          <a:fontRef idx="minor">
+            <a:schemeClr val="tx1"/>
+          </a:fontRef>
+        </p:style>
+      </p:cxnSp>
+      <p:sp>
+        <p:nvSpPr>
+          <p:cNvPr id="37" name="Rectangle: Rounded Corners 36">
+            <a:extLst>
+              <a:ext uri="{FF2B5EF4-FFF2-40B4-BE49-F238E27FC236}">
+                <a16:creationId xmlns:a16="http://schemas.microsoft.com/office/drawing/2014/main" id="{FBA4F5D3-8987-4446-B95A-DC10E42DEE2A}"/>
+              </a:ext>
+            </a:extLst>
+          </p:cNvPr>
+          <p:cNvSpPr/>
+          <p:nvPr/>
+        </p:nvSpPr>
+        <p:spPr>
+          <a:xfrm>
+            <a:off x="8495834" y="551150"/>
+            <a:ext cx="1454226" cy="826265"/>
+          </a:xfrm>
+          <a:prstGeom prst="roundRect">
+            <a:avLst/>
+          </a:prstGeom>
+        </p:spPr>
+        <p:style>
+          <a:lnRef idx="2">
+            <a:schemeClr val="accent1">
+              <a:shade val="50000"/>
+            </a:schemeClr>
+          </a:lnRef>
+          <a:fillRef idx="1">
+            <a:schemeClr val="accent1"/>
+          </a:fillRef>
+          <a:effectRef idx="0">
+            <a:schemeClr val="accent1"/>
+          </a:effectRef>
+          <a:fontRef idx="minor">
+            <a:schemeClr val="lt1"/>
+          </a:fontRef>
+        </p:style>
+        <p:txBody>
+          <a:bodyPr rtlCol="0" anchor="ctr"/>
+          <a:lstStyle/>
+          <a:p>
+            <a:pPr algn="ctr"/>
+            <a:r>
+              <a:rPr lang="pt-BR" dirty="0">
+                <a:solidFill>
+                  <a:schemeClr val="tx1"/>
+                </a:solidFill>
+              </a:rPr>
+              <a:t>MASTER</a:t>
+            </a:r>
+          </a:p>
+        </p:txBody>
+      </p:sp>
+      <p:sp>
+        <p:nvSpPr>
+          <p:cNvPr id="38" name="Rectangle: Rounded Corners 37">
+            <a:extLst>
+              <a:ext uri="{FF2B5EF4-FFF2-40B4-BE49-F238E27FC236}">
+                <a16:creationId xmlns:a16="http://schemas.microsoft.com/office/drawing/2014/main" id="{810B104A-B2C2-4A89-B692-FFA2239283C8}"/>
+              </a:ext>
+            </a:extLst>
+          </p:cNvPr>
+          <p:cNvSpPr/>
+          <p:nvPr/>
+        </p:nvSpPr>
+        <p:spPr>
+          <a:xfrm>
+            <a:off x="8495834" y="2333579"/>
+            <a:ext cx="1454226" cy="826265"/>
+          </a:xfrm>
+          <a:prstGeom prst="roundRect">
+            <a:avLst/>
+          </a:prstGeom>
+        </p:spPr>
+        <p:style>
+          <a:lnRef idx="2">
+            <a:schemeClr val="accent1">
+              <a:shade val="50000"/>
+            </a:schemeClr>
+          </a:lnRef>
+          <a:fillRef idx="1">
+            <a:schemeClr val="accent1"/>
+          </a:fillRef>
+          <a:effectRef idx="0">
+            <a:schemeClr val="accent1"/>
+          </a:effectRef>
+          <a:fontRef idx="minor">
+            <a:schemeClr val="lt1"/>
+          </a:fontRef>
+        </p:style>
+        <p:txBody>
+          <a:bodyPr rtlCol="0" anchor="ctr"/>
+          <a:lstStyle/>
+          <a:p>
+            <a:pPr algn="ctr"/>
+            <a:r>
+              <a:rPr lang="pt-BR" dirty="0">
+                <a:solidFill>
+                  <a:schemeClr val="tx1"/>
+                </a:solidFill>
+              </a:rPr>
+              <a:t>ORIGIN/</a:t>
+            </a:r>
+            <a:br>
+              <a:rPr lang="pt-BR" dirty="0">
+                <a:solidFill>
+                  <a:schemeClr val="tx1"/>
+                </a:solidFill>
+              </a:rPr>
+            </a:br>
+            <a:r>
+              <a:rPr lang="pt-BR" dirty="0">
+                <a:solidFill>
+                  <a:schemeClr val="tx1"/>
+                </a:solidFill>
+              </a:rPr>
+              <a:t>MASTER</a:t>
+            </a:r>
+          </a:p>
+        </p:txBody>
+      </p:sp>
+      <p:sp>
+        <p:nvSpPr>
+          <p:cNvPr id="39" name="Flowchart: Punched Tape 38">
+            <a:extLst>
+              <a:ext uri="{FF2B5EF4-FFF2-40B4-BE49-F238E27FC236}">
+                <a16:creationId xmlns:a16="http://schemas.microsoft.com/office/drawing/2014/main" id="{CFF1CB06-0515-4316-B7AC-BE2ADA3ED3FA}"/>
+              </a:ext>
+            </a:extLst>
+          </p:cNvPr>
+          <p:cNvSpPr/>
+          <p:nvPr/>
+        </p:nvSpPr>
+        <p:spPr>
+          <a:xfrm>
+            <a:off x="10497241" y="3629579"/>
+            <a:ext cx="1454226" cy="826265"/>
+          </a:xfrm>
+          <a:prstGeom prst="flowChartPunchedTape">
+            <a:avLst/>
+          </a:prstGeom>
+        </p:spPr>
+        <p:style>
+          <a:lnRef idx="2">
+            <a:schemeClr val="accent1">
+              <a:shade val="50000"/>
+            </a:schemeClr>
+          </a:lnRef>
+          <a:fillRef idx="1">
+            <a:schemeClr val="accent1"/>
+          </a:fillRef>
+          <a:effectRef idx="0">
+            <a:schemeClr val="accent1"/>
+          </a:effectRef>
+          <a:fontRef idx="minor">
+            <a:schemeClr val="lt1"/>
+          </a:fontRef>
+        </p:style>
+        <p:txBody>
+          <a:bodyPr rtlCol="0" anchor="ctr"/>
+          <a:lstStyle/>
+          <a:p>
+            <a:pPr algn="ctr"/>
+            <a:r>
+              <a:rPr lang="pt-BR" dirty="0">
+                <a:solidFill>
+                  <a:schemeClr val="tx1"/>
+                </a:solidFill>
+              </a:rPr>
+              <a:t>HEAD</a:t>
+            </a:r>
+          </a:p>
+        </p:txBody>
+      </p:sp>
+      <p:cxnSp>
+        <p:nvCxnSpPr>
+          <p:cNvPr id="40" name="Straight Arrow Connector 39">
+            <a:extLst>
+              <a:ext uri="{FF2B5EF4-FFF2-40B4-BE49-F238E27FC236}">
+                <a16:creationId xmlns:a16="http://schemas.microsoft.com/office/drawing/2014/main" id="{F449FB8C-5E27-4E5F-ABAD-965B5DF69742}"/>
+              </a:ext>
+            </a:extLst>
+          </p:cNvPr>
+          <p:cNvCxnSpPr>
+            <a:cxnSpLocks/>
+            <a:stCxn id="39" idx="1"/>
+            <a:endCxn id="43" idx="3"/>
+          </p:cNvCxnSpPr>
+          <p:nvPr/>
+        </p:nvCxnSpPr>
+        <p:spPr>
+          <a:xfrm flipH="1">
+            <a:off x="9950060" y="4042712"/>
+            <a:ext cx="547181" cy="1"/>
+          </a:xfrm>
+          <a:prstGeom prst="straightConnector1">
+            <a:avLst/>
+          </a:prstGeom>
+          <a:ln>
+            <a:tailEnd type="triangle"/>
+          </a:ln>
+        </p:spPr>
+        <p:style>
+          <a:lnRef idx="1">
+            <a:schemeClr val="accent1"/>
+          </a:lnRef>
+          <a:fillRef idx="0">
+            <a:schemeClr val="accent1"/>
+          </a:fillRef>
+          <a:effectRef idx="0">
+            <a:schemeClr val="accent1"/>
+          </a:effectRef>
+          <a:fontRef idx="minor">
+            <a:schemeClr val="tx1"/>
+          </a:fontRef>
+        </p:style>
+      </p:cxnSp>
+      <p:sp>
+        <p:nvSpPr>
+          <p:cNvPr id="42" name="Oval 41">
+            <a:extLst>
+              <a:ext uri="{FF2B5EF4-FFF2-40B4-BE49-F238E27FC236}">
+                <a16:creationId xmlns:a16="http://schemas.microsoft.com/office/drawing/2014/main" id="{EC0A4FE6-5057-4CE8-97CD-1A99A8754C8F}"/>
+              </a:ext>
+            </a:extLst>
+          </p:cNvPr>
+          <p:cNvSpPr/>
+          <p:nvPr/>
+        </p:nvSpPr>
+        <p:spPr>
+          <a:xfrm>
+            <a:off x="4674228" y="1037421"/>
+            <a:ext cx="1553378" cy="1134738"/>
+          </a:xfrm>
+          <a:prstGeom prst="ellipse">
+            <a:avLst/>
+          </a:prstGeom>
+        </p:spPr>
+        <p:style>
+          <a:lnRef idx="2">
+            <a:schemeClr val="accent1">
+              <a:shade val="50000"/>
+            </a:schemeClr>
+          </a:lnRef>
+          <a:fillRef idx="1">
+            <a:schemeClr val="accent1"/>
+          </a:fillRef>
+          <a:effectRef idx="0">
+            <a:schemeClr val="accent1"/>
+          </a:effectRef>
+          <a:fontRef idx="minor">
+            <a:schemeClr val="lt1"/>
+          </a:fontRef>
+        </p:style>
+        <p:txBody>
+          <a:bodyPr rtlCol="0" anchor="ctr"/>
+          <a:lstStyle/>
+          <a:p>
+            <a:pPr algn="ctr"/>
+            <a:r>
+              <a:rPr lang="pt-BR" dirty="0">
+                <a:solidFill>
+                  <a:schemeClr val="tx1"/>
+                </a:solidFill>
+              </a:rPr>
+              <a:t>93230ca</a:t>
+            </a:r>
+          </a:p>
+        </p:txBody>
+      </p:sp>
+      <p:sp>
+        <p:nvSpPr>
+          <p:cNvPr id="44" name="Flowchart: Document 43">
+            <a:extLst>
+              <a:ext uri="{FF2B5EF4-FFF2-40B4-BE49-F238E27FC236}">
+                <a16:creationId xmlns:a16="http://schemas.microsoft.com/office/drawing/2014/main" id="{E3DA4424-9147-491D-AA46-3D39D2C015AB}"/>
+              </a:ext>
+            </a:extLst>
+          </p:cNvPr>
+          <p:cNvSpPr/>
+          <p:nvPr/>
+        </p:nvSpPr>
+        <p:spPr>
+          <a:xfrm>
+            <a:off x="2836851" y="551150"/>
+            <a:ext cx="1189822" cy="612648"/>
+          </a:xfrm>
+          <a:prstGeom prst="flowChartDocument">
+            <a:avLst/>
+          </a:prstGeom>
+        </p:spPr>
+        <p:style>
+          <a:lnRef idx="2">
+            <a:schemeClr val="accent1">
+              <a:shade val="50000"/>
+            </a:schemeClr>
+          </a:lnRef>
+          <a:fillRef idx="1">
+            <a:schemeClr val="accent1"/>
+          </a:fillRef>
+          <a:effectRef idx="0">
+            <a:schemeClr val="accent1"/>
+          </a:effectRef>
+          <a:fontRef idx="minor">
+            <a:schemeClr val="lt1"/>
+          </a:fontRef>
+        </p:style>
+        <p:txBody>
+          <a:bodyPr rtlCol="0" anchor="ctr"/>
+          <a:lstStyle/>
+          <a:p>
+            <a:pPr algn="ctr"/>
+            <a:r>
+              <a:rPr lang="pt-BR" dirty="0">
+                <a:solidFill>
+                  <a:schemeClr val="tx1"/>
+                </a:solidFill>
+              </a:rPr>
+              <a:t>File1.txt</a:t>
+            </a:r>
+          </a:p>
+        </p:txBody>
+      </p:sp>
+      <p:sp>
+        <p:nvSpPr>
+          <p:cNvPr id="45" name="Flowchart: Document 44">
+            <a:extLst>
+              <a:ext uri="{FF2B5EF4-FFF2-40B4-BE49-F238E27FC236}">
+                <a16:creationId xmlns:a16="http://schemas.microsoft.com/office/drawing/2014/main" id="{FA177F2C-91C0-411D-857C-43EC0C733530}"/>
+              </a:ext>
+            </a:extLst>
+          </p:cNvPr>
+          <p:cNvSpPr/>
+          <p:nvPr/>
+        </p:nvSpPr>
+        <p:spPr>
+          <a:xfrm>
+            <a:off x="2836851" y="1432502"/>
+            <a:ext cx="1189822" cy="612648"/>
+          </a:xfrm>
+          <a:prstGeom prst="flowChartDocument">
+            <a:avLst/>
+          </a:prstGeom>
+        </p:spPr>
+        <p:style>
+          <a:lnRef idx="2">
+            <a:schemeClr val="accent1">
+              <a:shade val="50000"/>
+            </a:schemeClr>
+          </a:lnRef>
+          <a:fillRef idx="1">
+            <a:schemeClr val="accent1"/>
+          </a:fillRef>
+          <a:effectRef idx="0">
+            <a:schemeClr val="accent1"/>
+          </a:effectRef>
+          <a:fontRef idx="minor">
+            <a:schemeClr val="lt1"/>
+          </a:fontRef>
+        </p:style>
+        <p:txBody>
+          <a:bodyPr rtlCol="0" anchor="ctr"/>
+          <a:lstStyle/>
+          <a:p>
+            <a:pPr algn="ctr"/>
+            <a:r>
+              <a:rPr lang="pt-BR" dirty="0">
+                <a:solidFill>
+                  <a:schemeClr val="tx1"/>
+                </a:solidFill>
+              </a:rPr>
+              <a:t>File2.txt</a:t>
+            </a:r>
+          </a:p>
+        </p:txBody>
+      </p:sp>
+      <p:sp>
+        <p:nvSpPr>
+          <p:cNvPr id="46" name="Oval 45">
+            <a:extLst>
+              <a:ext uri="{FF2B5EF4-FFF2-40B4-BE49-F238E27FC236}">
+                <a16:creationId xmlns:a16="http://schemas.microsoft.com/office/drawing/2014/main" id="{72B9499B-C4AF-4ABB-B820-43FFB4A0775C}"/>
+              </a:ext>
+            </a:extLst>
+          </p:cNvPr>
+          <p:cNvSpPr/>
+          <p:nvPr/>
+        </p:nvSpPr>
+        <p:spPr>
+          <a:xfrm>
+            <a:off x="6595445" y="1037421"/>
+            <a:ext cx="1553378" cy="1134738"/>
+          </a:xfrm>
+          <a:prstGeom prst="ellipse">
+            <a:avLst/>
+          </a:prstGeom>
+        </p:spPr>
+        <p:style>
+          <a:lnRef idx="2">
+            <a:schemeClr val="accent1">
+              <a:shade val="50000"/>
+            </a:schemeClr>
+          </a:lnRef>
+          <a:fillRef idx="1">
+            <a:schemeClr val="accent1"/>
+          </a:fillRef>
+          <a:effectRef idx="0">
+            <a:schemeClr val="accent1"/>
+          </a:effectRef>
+          <a:fontRef idx="minor">
+            <a:schemeClr val="lt1"/>
+          </a:fontRef>
+        </p:style>
+        <p:txBody>
+          <a:bodyPr rtlCol="0" anchor="ctr"/>
+          <a:lstStyle/>
+          <a:p>
+            <a:pPr algn="ctr"/>
+            <a:r>
+              <a:rPr lang="pt-BR" dirty="0">
+                <a:solidFill>
+                  <a:schemeClr val="tx1"/>
+                </a:solidFill>
+              </a:rPr>
+              <a:t>0bd7901</a:t>
+            </a:r>
+          </a:p>
+        </p:txBody>
+      </p:sp>
+      <p:cxnSp>
+        <p:nvCxnSpPr>
+          <p:cNvPr id="9" name="Straight Arrow Connector 8">
+            <a:extLst>
+              <a:ext uri="{FF2B5EF4-FFF2-40B4-BE49-F238E27FC236}">
+                <a16:creationId xmlns:a16="http://schemas.microsoft.com/office/drawing/2014/main" id="{86B46F3F-6B76-425F-8D2A-CDDEC4BB6471}"/>
+              </a:ext>
+            </a:extLst>
+          </p:cNvPr>
+          <p:cNvCxnSpPr>
+            <a:stCxn id="46" idx="2"/>
+            <a:endCxn id="42" idx="6"/>
+          </p:cNvCxnSpPr>
+          <p:nvPr/>
+        </p:nvCxnSpPr>
+        <p:spPr>
+          <a:xfrm flipH="1">
+            <a:off x="6227606" y="1604790"/>
+            <a:ext cx="367839" cy="0"/>
+          </a:xfrm>
+          <a:prstGeom prst="straightConnector1">
+            <a:avLst/>
+          </a:prstGeom>
+          <a:ln>
+            <a:tailEnd type="triangle"/>
+          </a:ln>
+        </p:spPr>
+        <p:style>
+          <a:lnRef idx="1">
+            <a:schemeClr val="accent1"/>
+          </a:lnRef>
+          <a:fillRef idx="0">
+            <a:schemeClr val="accent1"/>
+          </a:fillRef>
+          <a:effectRef idx="0">
+            <a:schemeClr val="accent1"/>
+          </a:effectRef>
+          <a:fontRef idx="minor">
+            <a:schemeClr val="tx1"/>
+          </a:fontRef>
+        </p:style>
+      </p:cxnSp>
+      <p:cxnSp>
+        <p:nvCxnSpPr>
+          <p:cNvPr id="47" name="Straight Arrow Connector 46">
+            <a:extLst>
+              <a:ext uri="{FF2B5EF4-FFF2-40B4-BE49-F238E27FC236}">
+                <a16:creationId xmlns:a16="http://schemas.microsoft.com/office/drawing/2014/main" id="{6590E505-0548-487B-95B7-5A5AF54E44BB}"/>
+              </a:ext>
+            </a:extLst>
+          </p:cNvPr>
+          <p:cNvCxnSpPr>
+            <a:cxnSpLocks/>
+            <a:stCxn id="38" idx="1"/>
+            <a:endCxn id="46" idx="5"/>
+          </p:cNvCxnSpPr>
+          <p:nvPr/>
+        </p:nvCxnSpPr>
+        <p:spPr>
+          <a:xfrm flipH="1" flipV="1">
+            <a:off x="7921336" y="2005980"/>
+            <a:ext cx="574498" cy="740732"/>
+          </a:xfrm>
+          <a:prstGeom prst="straightConnector1">
+            <a:avLst/>
+          </a:prstGeom>
+          <a:ln>
+            <a:tailEnd type="triangle"/>
+          </a:ln>
+        </p:spPr>
+        <p:style>
+          <a:lnRef idx="1">
+            <a:schemeClr val="accent1"/>
+          </a:lnRef>
+          <a:fillRef idx="0">
+            <a:schemeClr val="accent1"/>
+          </a:fillRef>
+          <a:effectRef idx="0">
+            <a:schemeClr val="accent1"/>
+          </a:effectRef>
+          <a:fontRef idx="minor">
+            <a:schemeClr val="tx1"/>
+          </a:fontRef>
+        </p:style>
+      </p:cxnSp>
+      <p:cxnSp>
+        <p:nvCxnSpPr>
+          <p:cNvPr id="49" name="Straight Arrow Connector 48">
+            <a:extLst>
+              <a:ext uri="{FF2B5EF4-FFF2-40B4-BE49-F238E27FC236}">
+                <a16:creationId xmlns:a16="http://schemas.microsoft.com/office/drawing/2014/main" id="{2D4CBAC1-C287-410B-AE85-EB9997A23AC1}"/>
+              </a:ext>
+            </a:extLst>
+          </p:cNvPr>
+          <p:cNvCxnSpPr>
+            <a:stCxn id="37" idx="1"/>
+            <a:endCxn id="46" idx="7"/>
+          </p:cNvCxnSpPr>
+          <p:nvPr/>
+        </p:nvCxnSpPr>
+        <p:spPr>
+          <a:xfrm flipH="1">
+            <a:off x="7921336" y="964283"/>
+            <a:ext cx="574498" cy="239317"/>
+          </a:xfrm>
+          <a:prstGeom prst="straightConnector1">
+            <a:avLst/>
+          </a:prstGeom>
+          <a:ln>
+            <a:tailEnd type="triangle"/>
+          </a:ln>
+        </p:spPr>
+        <p:style>
+          <a:lnRef idx="1">
+            <a:schemeClr val="accent1"/>
+          </a:lnRef>
+          <a:fillRef idx="0">
+            <a:schemeClr val="accent1"/>
+          </a:fillRef>
+          <a:effectRef idx="0">
+            <a:schemeClr val="accent1"/>
+          </a:effectRef>
+          <a:fontRef idx="minor">
+            <a:schemeClr val="tx1"/>
+          </a:fontRef>
+        </p:style>
+      </p:cxnSp>
+      <p:sp>
+        <p:nvSpPr>
+          <p:cNvPr id="41" name="Oval 40">
+            <a:extLst>
+              <a:ext uri="{FF2B5EF4-FFF2-40B4-BE49-F238E27FC236}">
+                <a16:creationId xmlns:a16="http://schemas.microsoft.com/office/drawing/2014/main" id="{A40A42F3-4714-4FCA-9AC2-5C7C848FCC6F}"/>
+              </a:ext>
+            </a:extLst>
+          </p:cNvPr>
+          <p:cNvSpPr/>
+          <p:nvPr/>
+        </p:nvSpPr>
+        <p:spPr>
+          <a:xfrm>
+            <a:off x="6595445" y="3475344"/>
+            <a:ext cx="1553378" cy="1134738"/>
+          </a:xfrm>
+          <a:prstGeom prst="ellipse">
+            <a:avLst/>
+          </a:prstGeom>
+        </p:spPr>
+        <p:style>
+          <a:lnRef idx="2">
+            <a:schemeClr val="accent1">
+              <a:shade val="50000"/>
+            </a:schemeClr>
+          </a:lnRef>
+          <a:fillRef idx="1">
+            <a:schemeClr val="accent1"/>
+          </a:fillRef>
+          <a:effectRef idx="0">
+            <a:schemeClr val="accent1"/>
+          </a:effectRef>
+          <a:fontRef idx="minor">
+            <a:schemeClr val="lt1"/>
+          </a:fontRef>
+        </p:style>
+        <p:txBody>
+          <a:bodyPr rtlCol="0" anchor="ctr"/>
+          <a:lstStyle/>
+          <a:p>
+            <a:pPr algn="ctr"/>
+            <a:r>
+              <a:rPr lang="pt-BR" dirty="0">
+                <a:solidFill>
+                  <a:schemeClr val="tx1"/>
+                </a:solidFill>
+              </a:rPr>
+              <a:t>c8e4675</a:t>
+            </a:r>
+          </a:p>
+        </p:txBody>
+      </p:sp>
+      <p:sp>
+        <p:nvSpPr>
+          <p:cNvPr id="43" name="Rectangle: Rounded Corners 42">
+            <a:extLst>
+              <a:ext uri="{FF2B5EF4-FFF2-40B4-BE49-F238E27FC236}">
+                <a16:creationId xmlns:a16="http://schemas.microsoft.com/office/drawing/2014/main" id="{7DB7A850-A5EB-48FA-B16F-293758E65113}"/>
+              </a:ext>
+            </a:extLst>
+          </p:cNvPr>
+          <p:cNvSpPr/>
+          <p:nvPr/>
+        </p:nvSpPr>
+        <p:spPr>
+          <a:xfrm>
+            <a:off x="8495834" y="3629580"/>
+            <a:ext cx="1454226" cy="826265"/>
+          </a:xfrm>
+          <a:prstGeom prst="roundRect">
+            <a:avLst/>
+          </a:prstGeom>
+        </p:spPr>
+        <p:style>
+          <a:lnRef idx="2">
+            <a:schemeClr val="accent1">
+              <a:shade val="50000"/>
+            </a:schemeClr>
+          </a:lnRef>
+          <a:fillRef idx="1">
+            <a:schemeClr val="accent1"/>
+          </a:fillRef>
+          <a:effectRef idx="0">
+            <a:schemeClr val="accent1"/>
+          </a:effectRef>
+          <a:fontRef idx="minor">
+            <a:schemeClr val="lt1"/>
+          </a:fontRef>
+        </p:style>
+        <p:txBody>
+          <a:bodyPr rtlCol="0" anchor="ctr"/>
+          <a:lstStyle/>
+          <a:p>
+            <a:pPr algn="ctr"/>
+            <a:r>
+              <a:rPr lang="pt-BR" dirty="0">
+                <a:solidFill>
+                  <a:schemeClr val="tx1"/>
+                </a:solidFill>
+              </a:rPr>
+              <a:t>COOL</a:t>
+            </a:r>
+          </a:p>
+        </p:txBody>
+      </p:sp>
+      <p:cxnSp>
+        <p:nvCxnSpPr>
+          <p:cNvPr id="3" name="Straight Arrow Connector 2">
+            <a:extLst>
+              <a:ext uri="{FF2B5EF4-FFF2-40B4-BE49-F238E27FC236}">
+                <a16:creationId xmlns:a16="http://schemas.microsoft.com/office/drawing/2014/main" id="{E3CD74D0-37B5-4F79-B3DE-5FE0E352C612}"/>
+              </a:ext>
+            </a:extLst>
+          </p:cNvPr>
+          <p:cNvCxnSpPr>
+            <a:cxnSpLocks/>
+            <a:stCxn id="41" idx="0"/>
+            <a:endCxn id="46" idx="4"/>
+          </p:cNvCxnSpPr>
+          <p:nvPr/>
+        </p:nvCxnSpPr>
+        <p:spPr>
+          <a:xfrm flipV="1">
+            <a:off x="7372134" y="2172159"/>
+            <a:ext cx="0" cy="1303185"/>
+          </a:xfrm>
+          <a:prstGeom prst="straightConnector1">
+            <a:avLst/>
+          </a:prstGeom>
+          <a:ln>
+            <a:tailEnd type="triangle"/>
+          </a:ln>
+        </p:spPr>
+        <p:style>
+          <a:lnRef idx="1">
+            <a:schemeClr val="accent1"/>
+          </a:lnRef>
+          <a:fillRef idx="0">
+            <a:schemeClr val="accent1"/>
+          </a:fillRef>
+          <a:effectRef idx="0">
+            <a:schemeClr val="accent1"/>
+          </a:effectRef>
+          <a:fontRef idx="minor">
+            <a:schemeClr val="tx1"/>
+          </a:fontRef>
+        </p:style>
+      </p:cxnSp>
+      <p:cxnSp>
+        <p:nvCxnSpPr>
+          <p:cNvPr id="6" name="Straight Arrow Connector 5">
+            <a:extLst>
+              <a:ext uri="{FF2B5EF4-FFF2-40B4-BE49-F238E27FC236}">
+                <a16:creationId xmlns:a16="http://schemas.microsoft.com/office/drawing/2014/main" id="{EB77E17E-EA3C-498E-8B4D-C5082A8F0541}"/>
+              </a:ext>
+            </a:extLst>
+          </p:cNvPr>
+          <p:cNvCxnSpPr>
+            <a:stCxn id="43" idx="1"/>
+            <a:endCxn id="41" idx="6"/>
+          </p:cNvCxnSpPr>
+          <p:nvPr/>
+        </p:nvCxnSpPr>
+        <p:spPr>
+          <a:xfrm flipH="1">
+            <a:off x="8148823" y="4042713"/>
+            <a:ext cx="347011" cy="0"/>
+          </a:xfrm>
+          <a:prstGeom prst="straightConnector1">
+            <a:avLst/>
+          </a:prstGeom>
+          <a:ln>
+            <a:tailEnd type="triangle"/>
+          </a:ln>
+        </p:spPr>
+        <p:style>
+          <a:lnRef idx="1">
+            <a:schemeClr val="accent1"/>
+          </a:lnRef>
+          <a:fillRef idx="0">
+            <a:schemeClr val="accent1"/>
+          </a:fillRef>
+          <a:effectRef idx="0">
+            <a:schemeClr val="accent1"/>
+          </a:effectRef>
+          <a:fontRef idx="minor">
+            <a:schemeClr val="tx1"/>
+          </a:fontRef>
+        </p:style>
+      </p:cxnSp>
+      <p:sp>
+        <p:nvSpPr>
+          <p:cNvPr id="48" name="Flowchart: Document 47">
+            <a:extLst>
+              <a:ext uri="{FF2B5EF4-FFF2-40B4-BE49-F238E27FC236}">
+                <a16:creationId xmlns:a16="http://schemas.microsoft.com/office/drawing/2014/main" id="{8A3B6A4D-5060-4C6E-A33E-E63B3ED69A8B}"/>
+              </a:ext>
+            </a:extLst>
+          </p:cNvPr>
+          <p:cNvSpPr/>
+          <p:nvPr/>
+        </p:nvSpPr>
+        <p:spPr>
+          <a:xfrm>
+            <a:off x="813411" y="2313854"/>
+            <a:ext cx="1189822" cy="612648"/>
+          </a:xfrm>
+          <a:prstGeom prst="flowChartDocument">
+            <a:avLst/>
+          </a:prstGeom>
+        </p:spPr>
+        <p:style>
+          <a:lnRef idx="2">
+            <a:schemeClr val="accent1">
+              <a:shade val="50000"/>
+            </a:schemeClr>
+          </a:lnRef>
+          <a:fillRef idx="1">
+            <a:schemeClr val="accent1"/>
+          </a:fillRef>
+          <a:effectRef idx="0">
+            <a:schemeClr val="accent1"/>
+          </a:effectRef>
+          <a:fontRef idx="minor">
+            <a:schemeClr val="lt1"/>
+          </a:fontRef>
+        </p:style>
+        <p:txBody>
+          <a:bodyPr rtlCol="0" anchor="ctr"/>
+          <a:lstStyle/>
+          <a:p>
+            <a:pPr algn="ctr"/>
+            <a:r>
+              <a:rPr lang="pt-BR" dirty="0">
+                <a:solidFill>
+                  <a:schemeClr val="tx1"/>
+                </a:solidFill>
+              </a:rPr>
+              <a:t>Image.txt</a:t>
+            </a:r>
+          </a:p>
+        </p:txBody>
+      </p:sp>
+    </p:spTree>
+    <p:extLst>
+      <p:ext uri="{BB962C8B-B14F-4D97-AF65-F5344CB8AC3E}">
+        <p14:creationId xmlns:p14="http://schemas.microsoft.com/office/powerpoint/2010/main" val="4134276060"/>
+      </p:ext>
+    </p:extLst>
+  </p:cSld>
+  <p:clrMapOvr>
+    <a:masterClrMapping/>
+  </p:clrMapOvr>
+</p:sld>
+</file>
+
+<file path=ppt/slides/slide8.xml><?xml version="1.0" encoding="utf-8"?>
+<p:sld xmlns:a="http://schemas.openxmlformats.org/drawingml/2006/main" xmlns:r="http://schemas.openxmlformats.org/officeDocument/2006/relationships" xmlns:p="http://schemas.openxmlformats.org/presentationml/2006/main">
+  <p:cSld>
+    <p:spTree>
+      <p:nvGrpSpPr>
+        <p:cNvPr id="1" name=""/>
+        <p:cNvGrpSpPr/>
+        <p:nvPr/>
+      </p:nvGrpSpPr>
+      <p:grpSpPr>
+        <a:xfrm>
+          <a:off x="0" y="0"/>
+          <a:ext cx="0" cy="0"/>
+          <a:chOff x="0" y="0"/>
+          <a:chExt cx="0" cy="0"/>
+        </a:xfrm>
+      </p:grpSpPr>
+      <p:sp>
+        <p:nvSpPr>
+          <p:cNvPr id="30" name="Flowchart: Document 29">
+            <a:extLst>
+              <a:ext uri="{FF2B5EF4-FFF2-40B4-BE49-F238E27FC236}">
+                <a16:creationId xmlns:a16="http://schemas.microsoft.com/office/drawing/2014/main" id="{27A42941-7360-498F-899E-15C8EE29A963}"/>
+              </a:ext>
+            </a:extLst>
+          </p:cNvPr>
+          <p:cNvSpPr/>
+          <p:nvPr/>
+        </p:nvSpPr>
+        <p:spPr>
+          <a:xfrm>
+            <a:off x="174433" y="551150"/>
+            <a:ext cx="1189822" cy="612648"/>
+          </a:xfrm>
+          <a:prstGeom prst="flowChartDocument">
+            <a:avLst/>
+          </a:prstGeom>
+        </p:spPr>
+        <p:style>
+          <a:lnRef idx="2">
+            <a:schemeClr val="accent1">
+              <a:shade val="50000"/>
+            </a:schemeClr>
+          </a:lnRef>
+          <a:fillRef idx="1">
+            <a:schemeClr val="accent1"/>
+          </a:fillRef>
+          <a:effectRef idx="0">
+            <a:schemeClr val="accent1"/>
+          </a:effectRef>
+          <a:fontRef idx="minor">
+            <a:schemeClr val="lt1"/>
+          </a:fontRef>
+        </p:style>
+        <p:txBody>
+          <a:bodyPr rtlCol="0" anchor="ctr"/>
+          <a:lstStyle/>
+          <a:p>
+            <a:pPr algn="ctr"/>
+            <a:r>
+              <a:rPr lang="pt-BR" dirty="0">
+                <a:solidFill>
+                  <a:schemeClr val="tx1"/>
+                </a:solidFill>
+              </a:rPr>
+              <a:t>File1.txt</a:t>
+            </a:r>
+          </a:p>
+        </p:txBody>
+      </p:sp>
+      <p:sp>
+        <p:nvSpPr>
+          <p:cNvPr id="33" name="Flowchart: Document 32">
+            <a:extLst>
+              <a:ext uri="{FF2B5EF4-FFF2-40B4-BE49-F238E27FC236}">
+                <a16:creationId xmlns:a16="http://schemas.microsoft.com/office/drawing/2014/main" id="{DA127300-D428-4422-93A3-B1669BA15600}"/>
+              </a:ext>
+            </a:extLst>
+          </p:cNvPr>
+          <p:cNvSpPr/>
+          <p:nvPr/>
+        </p:nvSpPr>
+        <p:spPr>
+          <a:xfrm>
+            <a:off x="174433" y="1432502"/>
+            <a:ext cx="1189822" cy="612648"/>
+          </a:xfrm>
+          <a:prstGeom prst="flowChartDocument">
+            <a:avLst/>
+          </a:prstGeom>
+        </p:spPr>
+        <p:style>
+          <a:lnRef idx="2">
+            <a:schemeClr val="accent1">
+              <a:shade val="50000"/>
+            </a:schemeClr>
+          </a:lnRef>
+          <a:fillRef idx="1">
+            <a:schemeClr val="accent1"/>
+          </a:fillRef>
+          <a:effectRef idx="0">
+            <a:schemeClr val="accent1"/>
+          </a:effectRef>
+          <a:fontRef idx="minor">
+            <a:schemeClr val="lt1"/>
+          </a:fontRef>
+        </p:style>
+        <p:txBody>
+          <a:bodyPr rtlCol="0" anchor="ctr"/>
+          <a:lstStyle/>
+          <a:p>
+            <a:pPr algn="ctr"/>
+            <a:r>
+              <a:rPr lang="pt-BR" dirty="0">
+                <a:solidFill>
+                  <a:schemeClr val="tx1"/>
+                </a:solidFill>
+              </a:rPr>
+              <a:t>File2.txt</a:t>
+            </a:r>
+          </a:p>
+        </p:txBody>
+      </p:sp>
+      <p:sp>
+        <p:nvSpPr>
+          <p:cNvPr id="34" name="TextBox 33">
+            <a:extLst>
+              <a:ext uri="{FF2B5EF4-FFF2-40B4-BE49-F238E27FC236}">
+                <a16:creationId xmlns:a16="http://schemas.microsoft.com/office/drawing/2014/main" id="{A57D2F62-C7FD-4143-95DB-6741EF88EFEA}"/>
+              </a:ext>
+            </a:extLst>
+          </p:cNvPr>
+          <p:cNvSpPr txBox="1"/>
+          <p:nvPr/>
+        </p:nvSpPr>
+        <p:spPr>
+          <a:xfrm>
+            <a:off x="158669" y="3117341"/>
+            <a:ext cx="1205586" cy="369332"/>
+          </a:xfrm>
+          <a:prstGeom prst="rect">
+            <a:avLst/>
+          </a:prstGeom>
+          <a:noFill/>
+        </p:spPr>
+        <p:txBody>
+          <a:bodyPr wrap="none" rtlCol="0">
+            <a:spAutoFit/>
+          </a:bodyPr>
+          <a:lstStyle/>
+          <a:p>
+            <a:r>
+              <a:rPr lang="pt-BR" dirty="0"/>
+              <a:t>VISIONARY</a:t>
+            </a:r>
+          </a:p>
+        </p:txBody>
+      </p:sp>
+      <p:sp>
+        <p:nvSpPr>
+          <p:cNvPr id="35" name="TextBox 34">
+            <a:extLst>
+              <a:ext uri="{FF2B5EF4-FFF2-40B4-BE49-F238E27FC236}">
+                <a16:creationId xmlns:a16="http://schemas.microsoft.com/office/drawing/2014/main" id="{ED21A39D-49E8-4466-9652-9BF3F371C503}"/>
+              </a:ext>
+            </a:extLst>
+          </p:cNvPr>
+          <p:cNvSpPr txBox="1"/>
+          <p:nvPr/>
+        </p:nvSpPr>
+        <p:spPr>
+          <a:xfrm>
+            <a:off x="1966049" y="3117341"/>
+            <a:ext cx="968535" cy="646331"/>
+          </a:xfrm>
+          <a:prstGeom prst="rect">
+            <a:avLst/>
+          </a:prstGeom>
+          <a:noFill/>
+        </p:spPr>
+        <p:txBody>
+          <a:bodyPr wrap="none" rtlCol="0">
+            <a:spAutoFit/>
+          </a:bodyPr>
+          <a:lstStyle/>
+          <a:p>
+            <a:r>
+              <a:rPr lang="pt-BR" dirty="0"/>
+              <a:t>GITHUB</a:t>
+            </a:r>
+            <a:br>
+              <a:rPr lang="pt-BR" dirty="0"/>
+            </a:br>
+            <a:r>
+              <a:rPr lang="pt-BR" dirty="0"/>
+              <a:t>MASTER</a:t>
+            </a:r>
+          </a:p>
+        </p:txBody>
+      </p:sp>
+      <p:cxnSp>
+        <p:nvCxnSpPr>
+          <p:cNvPr id="36" name="Straight Connector 35">
+            <a:extLst>
+              <a:ext uri="{FF2B5EF4-FFF2-40B4-BE49-F238E27FC236}">
+                <a16:creationId xmlns:a16="http://schemas.microsoft.com/office/drawing/2014/main" id="{E0B35E76-BCA7-415E-8E38-0B4EBEFE48ED}"/>
+              </a:ext>
+            </a:extLst>
+          </p:cNvPr>
+          <p:cNvCxnSpPr/>
+          <p:nvPr/>
+        </p:nvCxnSpPr>
+        <p:spPr>
+          <a:xfrm>
+            <a:off x="4570163" y="416803"/>
+            <a:ext cx="0" cy="2445744"/>
+          </a:xfrm>
+          <a:prstGeom prst="line">
+            <a:avLst/>
+          </a:prstGeom>
+          <a:ln w="34925">
+            <a:solidFill>
+              <a:schemeClr val="tx2"/>
+            </a:solidFill>
+          </a:ln>
+        </p:spPr>
+        <p:style>
+          <a:lnRef idx="1">
+            <a:schemeClr val="accent1"/>
+          </a:lnRef>
+          <a:fillRef idx="0">
+            <a:schemeClr val="accent1"/>
+          </a:fillRef>
+          <a:effectRef idx="0">
+            <a:schemeClr val="accent1"/>
+          </a:effectRef>
+          <a:fontRef idx="minor">
+            <a:schemeClr val="tx1"/>
+          </a:fontRef>
+        </p:style>
+      </p:cxnSp>
+      <p:sp>
+        <p:nvSpPr>
+          <p:cNvPr id="37" name="Rectangle: Rounded Corners 36">
+            <a:extLst>
+              <a:ext uri="{FF2B5EF4-FFF2-40B4-BE49-F238E27FC236}">
+                <a16:creationId xmlns:a16="http://schemas.microsoft.com/office/drawing/2014/main" id="{FBA4F5D3-8987-4446-B95A-DC10E42DEE2A}"/>
+              </a:ext>
+            </a:extLst>
+          </p:cNvPr>
+          <p:cNvSpPr/>
+          <p:nvPr/>
+        </p:nvSpPr>
+        <p:spPr>
+          <a:xfrm>
+            <a:off x="8495834" y="210027"/>
+            <a:ext cx="1454226" cy="826265"/>
+          </a:xfrm>
+          <a:prstGeom prst="roundRect">
+            <a:avLst/>
+          </a:prstGeom>
+        </p:spPr>
+        <p:style>
+          <a:lnRef idx="2">
+            <a:schemeClr val="accent1">
+              <a:shade val="50000"/>
+            </a:schemeClr>
+          </a:lnRef>
+          <a:fillRef idx="1">
+            <a:schemeClr val="accent1"/>
+          </a:fillRef>
+          <a:effectRef idx="0">
+            <a:schemeClr val="accent1"/>
+          </a:effectRef>
+          <a:fontRef idx="minor">
+            <a:schemeClr val="lt1"/>
+          </a:fontRef>
+        </p:style>
+        <p:txBody>
+          <a:bodyPr rtlCol="0" anchor="ctr"/>
+          <a:lstStyle/>
+          <a:p>
+            <a:pPr algn="ctr"/>
+            <a:r>
+              <a:rPr lang="pt-BR" dirty="0">
+                <a:solidFill>
+                  <a:schemeClr val="tx1"/>
+                </a:solidFill>
+              </a:rPr>
+              <a:t>MASTER</a:t>
+            </a:r>
+          </a:p>
+        </p:txBody>
+      </p:sp>
+      <p:sp>
+        <p:nvSpPr>
+          <p:cNvPr id="38" name="Rectangle: Rounded Corners 37">
+            <a:extLst>
+              <a:ext uri="{FF2B5EF4-FFF2-40B4-BE49-F238E27FC236}">
+                <a16:creationId xmlns:a16="http://schemas.microsoft.com/office/drawing/2014/main" id="{810B104A-B2C2-4A89-B692-FFA2239283C8}"/>
+              </a:ext>
+            </a:extLst>
+          </p:cNvPr>
+          <p:cNvSpPr/>
+          <p:nvPr/>
+        </p:nvSpPr>
+        <p:spPr>
+          <a:xfrm>
+            <a:off x="8495834" y="1590324"/>
+            <a:ext cx="1454226" cy="826265"/>
+          </a:xfrm>
+          <a:prstGeom prst="roundRect">
+            <a:avLst/>
+          </a:prstGeom>
+        </p:spPr>
+        <p:style>
+          <a:lnRef idx="2">
+            <a:schemeClr val="accent1">
+              <a:shade val="50000"/>
+            </a:schemeClr>
+          </a:lnRef>
+          <a:fillRef idx="1">
+            <a:schemeClr val="accent1"/>
+          </a:fillRef>
+          <a:effectRef idx="0">
+            <a:schemeClr val="accent1"/>
+          </a:effectRef>
+          <a:fontRef idx="minor">
+            <a:schemeClr val="lt1"/>
+          </a:fontRef>
+        </p:style>
+        <p:txBody>
+          <a:bodyPr rtlCol="0" anchor="ctr"/>
+          <a:lstStyle/>
+          <a:p>
+            <a:pPr algn="ctr"/>
+            <a:r>
+              <a:rPr lang="pt-BR" dirty="0">
+                <a:solidFill>
+                  <a:schemeClr val="tx1"/>
+                </a:solidFill>
+              </a:rPr>
+              <a:t>ORIGIN/</a:t>
+            </a:r>
+            <a:br>
+              <a:rPr lang="pt-BR" dirty="0">
+                <a:solidFill>
+                  <a:schemeClr val="tx1"/>
+                </a:solidFill>
+              </a:rPr>
+            </a:br>
+            <a:r>
+              <a:rPr lang="pt-BR" dirty="0">
+                <a:solidFill>
+                  <a:schemeClr val="tx1"/>
+                </a:solidFill>
+              </a:rPr>
+              <a:t>MASTER</a:t>
+            </a:r>
+          </a:p>
+        </p:txBody>
+      </p:sp>
+      <p:sp>
+        <p:nvSpPr>
+          <p:cNvPr id="39" name="Flowchart: Punched Tape 38">
+            <a:extLst>
+              <a:ext uri="{FF2B5EF4-FFF2-40B4-BE49-F238E27FC236}">
+                <a16:creationId xmlns:a16="http://schemas.microsoft.com/office/drawing/2014/main" id="{CFF1CB06-0515-4316-B7AC-BE2ADA3ED3FA}"/>
+              </a:ext>
+            </a:extLst>
+          </p:cNvPr>
+          <p:cNvSpPr/>
+          <p:nvPr/>
+        </p:nvSpPr>
+        <p:spPr>
+          <a:xfrm>
+            <a:off x="10497241" y="3629579"/>
+            <a:ext cx="1454226" cy="826265"/>
+          </a:xfrm>
+          <a:prstGeom prst="flowChartPunchedTape">
+            <a:avLst/>
+          </a:prstGeom>
+        </p:spPr>
+        <p:style>
+          <a:lnRef idx="2">
+            <a:schemeClr val="accent1">
+              <a:shade val="50000"/>
+            </a:schemeClr>
+          </a:lnRef>
+          <a:fillRef idx="1">
+            <a:schemeClr val="accent1"/>
+          </a:fillRef>
+          <a:effectRef idx="0">
+            <a:schemeClr val="accent1"/>
+          </a:effectRef>
+          <a:fontRef idx="minor">
+            <a:schemeClr val="lt1"/>
+          </a:fontRef>
+        </p:style>
+        <p:txBody>
+          <a:bodyPr rtlCol="0" anchor="ctr"/>
+          <a:lstStyle/>
+          <a:p>
+            <a:pPr algn="ctr"/>
+            <a:r>
+              <a:rPr lang="pt-BR" dirty="0">
+                <a:solidFill>
+                  <a:schemeClr val="tx1"/>
+                </a:solidFill>
+              </a:rPr>
+              <a:t>HEAD</a:t>
+            </a:r>
+          </a:p>
+        </p:txBody>
+      </p:sp>
+      <p:cxnSp>
+        <p:nvCxnSpPr>
+          <p:cNvPr id="40" name="Straight Arrow Connector 39">
+            <a:extLst>
+              <a:ext uri="{FF2B5EF4-FFF2-40B4-BE49-F238E27FC236}">
+                <a16:creationId xmlns:a16="http://schemas.microsoft.com/office/drawing/2014/main" id="{F449FB8C-5E27-4E5F-ABAD-965B5DF69742}"/>
+              </a:ext>
+            </a:extLst>
+          </p:cNvPr>
+          <p:cNvCxnSpPr>
+            <a:cxnSpLocks/>
+            <a:stCxn id="39" idx="1"/>
+            <a:endCxn id="43" idx="3"/>
+          </p:cNvCxnSpPr>
+          <p:nvPr/>
+        </p:nvCxnSpPr>
+        <p:spPr>
+          <a:xfrm flipH="1">
+            <a:off x="9950060" y="4042712"/>
+            <a:ext cx="547181" cy="1"/>
+          </a:xfrm>
+          <a:prstGeom prst="straightConnector1">
+            <a:avLst/>
+          </a:prstGeom>
+          <a:ln>
+            <a:tailEnd type="triangle"/>
+          </a:ln>
+        </p:spPr>
+        <p:style>
+          <a:lnRef idx="1">
+            <a:schemeClr val="accent1"/>
+          </a:lnRef>
+          <a:fillRef idx="0">
+            <a:schemeClr val="accent1"/>
+          </a:fillRef>
+          <a:effectRef idx="0">
+            <a:schemeClr val="accent1"/>
+          </a:effectRef>
+          <a:fontRef idx="minor">
+            <a:schemeClr val="tx1"/>
+          </a:fontRef>
+        </p:style>
+      </p:cxnSp>
+      <p:sp>
+        <p:nvSpPr>
+          <p:cNvPr id="42" name="Oval 41">
+            <a:extLst>
+              <a:ext uri="{FF2B5EF4-FFF2-40B4-BE49-F238E27FC236}">
+                <a16:creationId xmlns:a16="http://schemas.microsoft.com/office/drawing/2014/main" id="{EC0A4FE6-5057-4CE8-97CD-1A99A8754C8F}"/>
+              </a:ext>
+            </a:extLst>
+          </p:cNvPr>
+          <p:cNvSpPr/>
+          <p:nvPr/>
+        </p:nvSpPr>
+        <p:spPr>
+          <a:xfrm>
+            <a:off x="4674228" y="1037421"/>
+            <a:ext cx="1553378" cy="1134738"/>
+          </a:xfrm>
+          <a:prstGeom prst="ellipse">
+            <a:avLst/>
+          </a:prstGeom>
+        </p:spPr>
+        <p:style>
+          <a:lnRef idx="2">
+            <a:schemeClr val="accent1">
+              <a:shade val="50000"/>
+            </a:schemeClr>
+          </a:lnRef>
+          <a:fillRef idx="1">
+            <a:schemeClr val="accent1"/>
+          </a:fillRef>
+          <a:effectRef idx="0">
+            <a:schemeClr val="accent1"/>
+          </a:effectRef>
+          <a:fontRef idx="minor">
+            <a:schemeClr val="lt1"/>
+          </a:fontRef>
+        </p:style>
+        <p:txBody>
+          <a:bodyPr rtlCol="0" anchor="ctr"/>
+          <a:lstStyle/>
+          <a:p>
+            <a:pPr algn="ctr"/>
+            <a:r>
+              <a:rPr lang="pt-BR" dirty="0">
+                <a:solidFill>
+                  <a:schemeClr val="tx1"/>
+                </a:solidFill>
+              </a:rPr>
+              <a:t>93230ca</a:t>
+            </a:r>
+          </a:p>
+        </p:txBody>
+      </p:sp>
+      <p:sp>
+        <p:nvSpPr>
+          <p:cNvPr id="44" name="Flowchart: Document 43">
+            <a:extLst>
+              <a:ext uri="{FF2B5EF4-FFF2-40B4-BE49-F238E27FC236}">
+                <a16:creationId xmlns:a16="http://schemas.microsoft.com/office/drawing/2014/main" id="{E3DA4424-9147-491D-AA46-3D39D2C015AB}"/>
+              </a:ext>
+            </a:extLst>
+          </p:cNvPr>
+          <p:cNvSpPr/>
+          <p:nvPr/>
+        </p:nvSpPr>
+        <p:spPr>
+          <a:xfrm>
+            <a:off x="1878384" y="551150"/>
+            <a:ext cx="1189822" cy="612648"/>
+          </a:xfrm>
+          <a:prstGeom prst="flowChartDocument">
+            <a:avLst/>
+          </a:prstGeom>
+        </p:spPr>
+        <p:style>
+          <a:lnRef idx="2">
+            <a:schemeClr val="accent1">
+              <a:shade val="50000"/>
+            </a:schemeClr>
+          </a:lnRef>
+          <a:fillRef idx="1">
+            <a:schemeClr val="accent1"/>
+          </a:fillRef>
+          <a:effectRef idx="0">
+            <a:schemeClr val="accent1"/>
+          </a:effectRef>
+          <a:fontRef idx="minor">
+            <a:schemeClr val="lt1"/>
+          </a:fontRef>
+        </p:style>
+        <p:txBody>
+          <a:bodyPr rtlCol="0" anchor="ctr"/>
+          <a:lstStyle/>
+          <a:p>
+            <a:pPr algn="ctr"/>
+            <a:r>
+              <a:rPr lang="pt-BR" dirty="0">
+                <a:solidFill>
+                  <a:schemeClr val="tx1"/>
+                </a:solidFill>
+              </a:rPr>
+              <a:t>File1.txt</a:t>
+            </a:r>
+          </a:p>
+        </p:txBody>
+      </p:sp>
+      <p:sp>
+        <p:nvSpPr>
+          <p:cNvPr id="45" name="Flowchart: Document 44">
+            <a:extLst>
+              <a:ext uri="{FF2B5EF4-FFF2-40B4-BE49-F238E27FC236}">
+                <a16:creationId xmlns:a16="http://schemas.microsoft.com/office/drawing/2014/main" id="{FA177F2C-91C0-411D-857C-43EC0C733530}"/>
+              </a:ext>
+            </a:extLst>
+          </p:cNvPr>
+          <p:cNvSpPr/>
+          <p:nvPr/>
+        </p:nvSpPr>
+        <p:spPr>
+          <a:xfrm>
+            <a:off x="1878384" y="1432502"/>
+            <a:ext cx="1189822" cy="612648"/>
+          </a:xfrm>
+          <a:prstGeom prst="flowChartDocument">
+            <a:avLst/>
+          </a:prstGeom>
+        </p:spPr>
+        <p:style>
+          <a:lnRef idx="2">
+            <a:schemeClr val="accent1">
+              <a:shade val="50000"/>
+            </a:schemeClr>
+          </a:lnRef>
+          <a:fillRef idx="1">
+            <a:schemeClr val="accent1"/>
+          </a:fillRef>
+          <a:effectRef idx="0">
+            <a:schemeClr val="accent1"/>
+          </a:effectRef>
+          <a:fontRef idx="minor">
+            <a:schemeClr val="lt1"/>
+          </a:fontRef>
+        </p:style>
+        <p:txBody>
+          <a:bodyPr rtlCol="0" anchor="ctr"/>
+          <a:lstStyle/>
+          <a:p>
+            <a:pPr algn="ctr"/>
+            <a:r>
+              <a:rPr lang="pt-BR" dirty="0">
+                <a:solidFill>
+                  <a:schemeClr val="tx1"/>
+                </a:solidFill>
+              </a:rPr>
+              <a:t>File2.txt</a:t>
+            </a:r>
+          </a:p>
+        </p:txBody>
+      </p:sp>
+      <p:sp>
+        <p:nvSpPr>
+          <p:cNvPr id="46" name="Oval 45">
+            <a:extLst>
+              <a:ext uri="{FF2B5EF4-FFF2-40B4-BE49-F238E27FC236}">
+                <a16:creationId xmlns:a16="http://schemas.microsoft.com/office/drawing/2014/main" id="{72B9499B-C4AF-4ABB-B820-43FFB4A0775C}"/>
+              </a:ext>
+            </a:extLst>
+          </p:cNvPr>
+          <p:cNvSpPr/>
+          <p:nvPr/>
+        </p:nvSpPr>
+        <p:spPr>
+          <a:xfrm>
+            <a:off x="6595445" y="1037421"/>
+            <a:ext cx="1553378" cy="1134738"/>
+          </a:xfrm>
+          <a:prstGeom prst="ellipse">
+            <a:avLst/>
+          </a:prstGeom>
+        </p:spPr>
+        <p:style>
+          <a:lnRef idx="2">
+            <a:schemeClr val="accent1">
+              <a:shade val="50000"/>
+            </a:schemeClr>
+          </a:lnRef>
+          <a:fillRef idx="1">
+            <a:schemeClr val="accent1"/>
+          </a:fillRef>
+          <a:effectRef idx="0">
+            <a:schemeClr val="accent1"/>
+          </a:effectRef>
+          <a:fontRef idx="minor">
+            <a:schemeClr val="lt1"/>
+          </a:fontRef>
+        </p:style>
+        <p:txBody>
+          <a:bodyPr rtlCol="0" anchor="ctr"/>
+          <a:lstStyle/>
+          <a:p>
+            <a:pPr algn="ctr"/>
+            <a:r>
+              <a:rPr lang="pt-BR" dirty="0">
+                <a:solidFill>
+                  <a:schemeClr val="tx1"/>
+                </a:solidFill>
+              </a:rPr>
+              <a:t>0bd7901</a:t>
+            </a:r>
+          </a:p>
+        </p:txBody>
+      </p:sp>
+      <p:cxnSp>
+        <p:nvCxnSpPr>
+          <p:cNvPr id="9" name="Straight Arrow Connector 8">
+            <a:extLst>
+              <a:ext uri="{FF2B5EF4-FFF2-40B4-BE49-F238E27FC236}">
+                <a16:creationId xmlns:a16="http://schemas.microsoft.com/office/drawing/2014/main" id="{86B46F3F-6B76-425F-8D2A-CDDEC4BB6471}"/>
+              </a:ext>
+            </a:extLst>
+          </p:cNvPr>
+          <p:cNvCxnSpPr>
+            <a:stCxn id="46" idx="2"/>
+            <a:endCxn id="42" idx="6"/>
+          </p:cNvCxnSpPr>
+          <p:nvPr/>
+        </p:nvCxnSpPr>
+        <p:spPr>
+          <a:xfrm flipH="1">
+            <a:off x="6227606" y="1604790"/>
+            <a:ext cx="367839" cy="0"/>
+          </a:xfrm>
+          <a:prstGeom prst="straightConnector1">
+            <a:avLst/>
+          </a:prstGeom>
+          <a:ln>
+            <a:tailEnd type="triangle"/>
+          </a:ln>
+        </p:spPr>
+        <p:style>
+          <a:lnRef idx="1">
+            <a:schemeClr val="accent1"/>
+          </a:lnRef>
+          <a:fillRef idx="0">
+            <a:schemeClr val="accent1"/>
+          </a:fillRef>
+          <a:effectRef idx="0">
+            <a:schemeClr val="accent1"/>
+          </a:effectRef>
+          <a:fontRef idx="minor">
+            <a:schemeClr val="tx1"/>
+          </a:fontRef>
+        </p:style>
+      </p:cxnSp>
+      <p:cxnSp>
+        <p:nvCxnSpPr>
+          <p:cNvPr id="47" name="Straight Arrow Connector 46">
+            <a:extLst>
+              <a:ext uri="{FF2B5EF4-FFF2-40B4-BE49-F238E27FC236}">
+                <a16:creationId xmlns:a16="http://schemas.microsoft.com/office/drawing/2014/main" id="{6590E505-0548-487B-95B7-5A5AF54E44BB}"/>
+              </a:ext>
+            </a:extLst>
+          </p:cNvPr>
+          <p:cNvCxnSpPr>
+            <a:cxnSpLocks/>
+            <a:stCxn id="38" idx="1"/>
+            <a:endCxn id="46" idx="5"/>
+          </p:cNvCxnSpPr>
+          <p:nvPr/>
+        </p:nvCxnSpPr>
+        <p:spPr>
+          <a:xfrm flipH="1">
+            <a:off x="7921336" y="2003457"/>
+            <a:ext cx="574498" cy="2523"/>
+          </a:xfrm>
+          <a:prstGeom prst="straightConnector1">
+            <a:avLst/>
+          </a:prstGeom>
+          <a:ln>
+            <a:tailEnd type="triangle"/>
+          </a:ln>
+        </p:spPr>
+        <p:style>
+          <a:lnRef idx="1">
+            <a:schemeClr val="accent1"/>
+          </a:lnRef>
+          <a:fillRef idx="0">
+            <a:schemeClr val="accent1"/>
+          </a:fillRef>
+          <a:effectRef idx="0">
+            <a:schemeClr val="accent1"/>
+          </a:effectRef>
+          <a:fontRef idx="minor">
+            <a:schemeClr val="tx1"/>
+          </a:fontRef>
+        </p:style>
+      </p:cxnSp>
+      <p:cxnSp>
+        <p:nvCxnSpPr>
+          <p:cNvPr id="49" name="Straight Arrow Connector 48">
+            <a:extLst>
+              <a:ext uri="{FF2B5EF4-FFF2-40B4-BE49-F238E27FC236}">
+                <a16:creationId xmlns:a16="http://schemas.microsoft.com/office/drawing/2014/main" id="{2D4CBAC1-C287-410B-AE85-EB9997A23AC1}"/>
+              </a:ext>
+            </a:extLst>
+          </p:cNvPr>
+          <p:cNvCxnSpPr>
+            <a:stCxn id="37" idx="1"/>
+            <a:endCxn id="46" idx="7"/>
+          </p:cNvCxnSpPr>
+          <p:nvPr/>
+        </p:nvCxnSpPr>
+        <p:spPr>
+          <a:xfrm flipH="1">
+            <a:off x="7921336" y="623160"/>
+            <a:ext cx="574498" cy="580440"/>
+          </a:xfrm>
+          <a:prstGeom prst="straightConnector1">
+            <a:avLst/>
+          </a:prstGeom>
+          <a:ln>
+            <a:tailEnd type="triangle"/>
+          </a:ln>
+        </p:spPr>
+        <p:style>
+          <a:lnRef idx="1">
+            <a:schemeClr val="accent1"/>
+          </a:lnRef>
+          <a:fillRef idx="0">
+            <a:schemeClr val="accent1"/>
+          </a:fillRef>
+          <a:effectRef idx="0">
+            <a:schemeClr val="accent1"/>
+          </a:effectRef>
+          <a:fontRef idx="minor">
+            <a:schemeClr val="tx1"/>
+          </a:fontRef>
+        </p:style>
+      </p:cxnSp>
+      <p:sp>
+        <p:nvSpPr>
+          <p:cNvPr id="41" name="Oval 40">
+            <a:extLst>
+              <a:ext uri="{FF2B5EF4-FFF2-40B4-BE49-F238E27FC236}">
+                <a16:creationId xmlns:a16="http://schemas.microsoft.com/office/drawing/2014/main" id="{A40A42F3-4714-4FCA-9AC2-5C7C848FCC6F}"/>
+              </a:ext>
+            </a:extLst>
+          </p:cNvPr>
+          <p:cNvSpPr/>
+          <p:nvPr/>
+        </p:nvSpPr>
+        <p:spPr>
+          <a:xfrm>
+            <a:off x="6595445" y="3475344"/>
+            <a:ext cx="1553378" cy="1134738"/>
+          </a:xfrm>
+          <a:prstGeom prst="ellipse">
+            <a:avLst/>
+          </a:prstGeom>
+        </p:spPr>
+        <p:style>
+          <a:lnRef idx="2">
+            <a:schemeClr val="accent1">
+              <a:shade val="50000"/>
+            </a:schemeClr>
+          </a:lnRef>
+          <a:fillRef idx="1">
+            <a:schemeClr val="accent1"/>
+          </a:fillRef>
+          <a:effectRef idx="0">
+            <a:schemeClr val="accent1"/>
+          </a:effectRef>
+          <a:fontRef idx="minor">
+            <a:schemeClr val="lt1"/>
+          </a:fontRef>
+        </p:style>
+        <p:txBody>
+          <a:bodyPr rtlCol="0" anchor="ctr"/>
+          <a:lstStyle/>
+          <a:p>
+            <a:pPr algn="ctr"/>
+            <a:r>
+              <a:rPr lang="pt-BR" dirty="0">
+                <a:solidFill>
+                  <a:schemeClr val="tx1"/>
+                </a:solidFill>
+              </a:rPr>
+              <a:t>c8e4675</a:t>
+            </a:r>
+          </a:p>
+        </p:txBody>
+      </p:sp>
+      <p:sp>
+        <p:nvSpPr>
+          <p:cNvPr id="43" name="Rectangle: Rounded Corners 42">
+            <a:extLst>
+              <a:ext uri="{FF2B5EF4-FFF2-40B4-BE49-F238E27FC236}">
+                <a16:creationId xmlns:a16="http://schemas.microsoft.com/office/drawing/2014/main" id="{7DB7A850-A5EB-48FA-B16F-293758E65113}"/>
+              </a:ext>
+            </a:extLst>
+          </p:cNvPr>
+          <p:cNvSpPr/>
+          <p:nvPr/>
+        </p:nvSpPr>
+        <p:spPr>
+          <a:xfrm>
+            <a:off x="8495834" y="3629580"/>
+            <a:ext cx="1454226" cy="826265"/>
+          </a:xfrm>
+          <a:prstGeom prst="roundRect">
+            <a:avLst/>
+          </a:prstGeom>
+        </p:spPr>
+        <p:style>
+          <a:lnRef idx="2">
+            <a:schemeClr val="accent1">
+              <a:shade val="50000"/>
+            </a:schemeClr>
+          </a:lnRef>
+          <a:fillRef idx="1">
+            <a:schemeClr val="accent1"/>
+          </a:fillRef>
+          <a:effectRef idx="0">
+            <a:schemeClr val="accent1"/>
+          </a:effectRef>
+          <a:fontRef idx="minor">
+            <a:schemeClr val="lt1"/>
+          </a:fontRef>
+        </p:style>
+        <p:txBody>
+          <a:bodyPr rtlCol="0" anchor="ctr"/>
+          <a:lstStyle/>
+          <a:p>
+            <a:pPr algn="ctr"/>
+            <a:r>
+              <a:rPr lang="pt-BR" dirty="0">
+                <a:solidFill>
+                  <a:schemeClr val="tx1"/>
+                </a:solidFill>
+              </a:rPr>
+              <a:t>COOL</a:t>
+            </a:r>
+          </a:p>
+        </p:txBody>
+      </p:sp>
+      <p:cxnSp>
+        <p:nvCxnSpPr>
+          <p:cNvPr id="3" name="Straight Arrow Connector 2">
+            <a:extLst>
+              <a:ext uri="{FF2B5EF4-FFF2-40B4-BE49-F238E27FC236}">
+                <a16:creationId xmlns:a16="http://schemas.microsoft.com/office/drawing/2014/main" id="{E3CD74D0-37B5-4F79-B3DE-5FE0E352C612}"/>
+              </a:ext>
+            </a:extLst>
+          </p:cNvPr>
+          <p:cNvCxnSpPr>
+            <a:cxnSpLocks/>
+            <a:stCxn id="41" idx="0"/>
+            <a:endCxn id="46" idx="4"/>
+          </p:cNvCxnSpPr>
+          <p:nvPr/>
+        </p:nvCxnSpPr>
+        <p:spPr>
+          <a:xfrm flipV="1">
+            <a:off x="7372134" y="2172159"/>
+            <a:ext cx="0" cy="1303185"/>
+          </a:xfrm>
+          <a:prstGeom prst="straightConnector1">
+            <a:avLst/>
+          </a:prstGeom>
+          <a:ln>
+            <a:tailEnd type="triangle"/>
+          </a:ln>
+        </p:spPr>
+        <p:style>
+          <a:lnRef idx="1">
+            <a:schemeClr val="accent1"/>
+          </a:lnRef>
+          <a:fillRef idx="0">
+            <a:schemeClr val="accent1"/>
+          </a:fillRef>
+          <a:effectRef idx="0">
+            <a:schemeClr val="accent1"/>
+          </a:effectRef>
+          <a:fontRef idx="minor">
+            <a:schemeClr val="tx1"/>
+          </a:fontRef>
+        </p:style>
+      </p:cxnSp>
+      <p:cxnSp>
+        <p:nvCxnSpPr>
+          <p:cNvPr id="6" name="Straight Arrow Connector 5">
+            <a:extLst>
+              <a:ext uri="{FF2B5EF4-FFF2-40B4-BE49-F238E27FC236}">
+                <a16:creationId xmlns:a16="http://schemas.microsoft.com/office/drawing/2014/main" id="{EB77E17E-EA3C-498E-8B4D-C5082A8F0541}"/>
+              </a:ext>
+            </a:extLst>
+          </p:cNvPr>
+          <p:cNvCxnSpPr>
+            <a:stCxn id="43" idx="1"/>
+            <a:endCxn id="41" idx="6"/>
+          </p:cNvCxnSpPr>
+          <p:nvPr/>
+        </p:nvCxnSpPr>
+        <p:spPr>
+          <a:xfrm flipH="1">
+            <a:off x="8148823" y="4042713"/>
+            <a:ext cx="347011" cy="0"/>
+          </a:xfrm>
+          <a:prstGeom prst="straightConnector1">
+            <a:avLst/>
+          </a:prstGeom>
+          <a:ln>
+            <a:tailEnd type="triangle"/>
+          </a:ln>
+        </p:spPr>
+        <p:style>
+          <a:lnRef idx="1">
+            <a:schemeClr val="accent1"/>
+          </a:lnRef>
+          <a:fillRef idx="0">
+            <a:schemeClr val="accent1"/>
+          </a:fillRef>
+          <a:effectRef idx="0">
+            <a:schemeClr val="accent1"/>
+          </a:effectRef>
+          <a:fontRef idx="minor">
+            <a:schemeClr val="tx1"/>
+          </a:fontRef>
+        </p:style>
+      </p:cxnSp>
+      <p:sp>
+        <p:nvSpPr>
+          <p:cNvPr id="48" name="Flowchart: Document 47">
+            <a:extLst>
+              <a:ext uri="{FF2B5EF4-FFF2-40B4-BE49-F238E27FC236}">
+                <a16:creationId xmlns:a16="http://schemas.microsoft.com/office/drawing/2014/main" id="{8A3B6A4D-5060-4C6E-A33E-E63B3ED69A8B}"/>
+              </a:ext>
+            </a:extLst>
+          </p:cNvPr>
+          <p:cNvSpPr/>
+          <p:nvPr/>
+        </p:nvSpPr>
+        <p:spPr>
+          <a:xfrm>
+            <a:off x="174433" y="2313854"/>
+            <a:ext cx="1189822" cy="612648"/>
+          </a:xfrm>
+          <a:prstGeom prst="flowChartDocument">
+            <a:avLst/>
+          </a:prstGeom>
+        </p:spPr>
+        <p:style>
+          <a:lnRef idx="2">
+            <a:schemeClr val="accent1">
+              <a:shade val="50000"/>
+            </a:schemeClr>
+          </a:lnRef>
+          <a:fillRef idx="1">
+            <a:schemeClr val="accent1"/>
+          </a:fillRef>
+          <a:effectRef idx="0">
+            <a:schemeClr val="accent1"/>
+          </a:effectRef>
+          <a:fontRef idx="minor">
+            <a:schemeClr val="lt1"/>
+          </a:fontRef>
+        </p:style>
+        <p:txBody>
+          <a:bodyPr rtlCol="0" anchor="ctr"/>
+          <a:lstStyle/>
+          <a:p>
+            <a:pPr algn="ctr"/>
+            <a:r>
+              <a:rPr lang="pt-BR" dirty="0">
+                <a:solidFill>
+                  <a:schemeClr val="tx1"/>
+                </a:solidFill>
+              </a:rPr>
+              <a:t>Image.txt</a:t>
+            </a:r>
+          </a:p>
+        </p:txBody>
+      </p:sp>
+      <p:sp>
+        <p:nvSpPr>
+          <p:cNvPr id="26" name="Rectangle: Rounded Corners 25">
+            <a:extLst>
+              <a:ext uri="{FF2B5EF4-FFF2-40B4-BE49-F238E27FC236}">
+                <a16:creationId xmlns:a16="http://schemas.microsoft.com/office/drawing/2014/main" id="{4E6ACF27-807C-4D7B-AA22-D52CFBC088E3}"/>
+              </a:ext>
+            </a:extLst>
+          </p:cNvPr>
+          <p:cNvSpPr/>
+          <p:nvPr/>
+        </p:nvSpPr>
+        <p:spPr>
+          <a:xfrm>
+            <a:off x="8463386" y="2570825"/>
+            <a:ext cx="1454226" cy="826265"/>
+          </a:xfrm>
+          <a:prstGeom prst="roundRect">
+            <a:avLst/>
+          </a:prstGeom>
+        </p:spPr>
+        <p:style>
+          <a:lnRef idx="2">
+            <a:schemeClr val="accent1">
+              <a:shade val="50000"/>
+            </a:schemeClr>
+          </a:lnRef>
+          <a:fillRef idx="1">
+            <a:schemeClr val="accent1"/>
+          </a:fillRef>
+          <a:effectRef idx="0">
+            <a:schemeClr val="accent1"/>
+          </a:effectRef>
+          <a:fontRef idx="minor">
+            <a:schemeClr val="lt1"/>
+          </a:fontRef>
+        </p:style>
+        <p:txBody>
+          <a:bodyPr rtlCol="0" anchor="ctr"/>
+          <a:lstStyle/>
+          <a:p>
+            <a:pPr algn="ctr"/>
+            <a:r>
+              <a:rPr lang="pt-BR" dirty="0">
+                <a:solidFill>
+                  <a:schemeClr val="tx1"/>
+                </a:solidFill>
+              </a:rPr>
+              <a:t>ORIGIN/</a:t>
+            </a:r>
+            <a:br>
+              <a:rPr lang="pt-BR" dirty="0">
+                <a:solidFill>
+                  <a:schemeClr val="tx1"/>
+                </a:solidFill>
+              </a:rPr>
+            </a:br>
+            <a:r>
+              <a:rPr lang="pt-BR" dirty="0">
+                <a:solidFill>
+                  <a:schemeClr val="tx1"/>
+                </a:solidFill>
+              </a:rPr>
+              <a:t>COOL</a:t>
+            </a:r>
+          </a:p>
+        </p:txBody>
+      </p:sp>
+      <p:cxnSp>
+        <p:nvCxnSpPr>
+          <p:cNvPr id="8" name="Straight Arrow Connector 7">
+            <a:extLst>
+              <a:ext uri="{FF2B5EF4-FFF2-40B4-BE49-F238E27FC236}">
+                <a16:creationId xmlns:a16="http://schemas.microsoft.com/office/drawing/2014/main" id="{5D19C799-F39C-47A0-9551-A50D2402429C}"/>
+              </a:ext>
+            </a:extLst>
+          </p:cNvPr>
+          <p:cNvCxnSpPr>
+            <a:stCxn id="26" idx="1"/>
+            <a:endCxn id="41" idx="7"/>
+          </p:cNvCxnSpPr>
+          <p:nvPr/>
+        </p:nvCxnSpPr>
+        <p:spPr>
+          <a:xfrm flipH="1">
+            <a:off x="7921336" y="2983958"/>
+            <a:ext cx="542050" cy="657565"/>
+          </a:xfrm>
+          <a:prstGeom prst="straightConnector1">
+            <a:avLst/>
+          </a:prstGeom>
+          <a:ln>
+            <a:tailEnd type="triangle"/>
+          </a:ln>
+        </p:spPr>
+        <p:style>
+          <a:lnRef idx="1">
+            <a:schemeClr val="accent1"/>
+          </a:lnRef>
+          <a:fillRef idx="0">
+            <a:schemeClr val="accent1"/>
+          </a:fillRef>
+          <a:effectRef idx="0">
+            <a:schemeClr val="accent1"/>
+          </a:effectRef>
+          <a:fontRef idx="minor">
+            <a:schemeClr val="tx1"/>
+          </a:fontRef>
+        </p:style>
+      </p:cxnSp>
+      <p:sp>
+        <p:nvSpPr>
+          <p:cNvPr id="29" name="Flowchart: Document 28">
+            <a:extLst>
+              <a:ext uri="{FF2B5EF4-FFF2-40B4-BE49-F238E27FC236}">
+                <a16:creationId xmlns:a16="http://schemas.microsoft.com/office/drawing/2014/main" id="{6A0BF4A4-645C-4C0E-8E1E-8443FE3647A1}"/>
+              </a:ext>
+            </a:extLst>
+          </p:cNvPr>
+          <p:cNvSpPr/>
+          <p:nvPr/>
+        </p:nvSpPr>
+        <p:spPr>
+          <a:xfrm>
+            <a:off x="3240799" y="551150"/>
+            <a:ext cx="1189822" cy="612648"/>
+          </a:xfrm>
+          <a:prstGeom prst="flowChartDocument">
+            <a:avLst/>
+          </a:prstGeom>
+        </p:spPr>
+        <p:style>
+          <a:lnRef idx="2">
+            <a:schemeClr val="accent1">
+              <a:shade val="50000"/>
+            </a:schemeClr>
+          </a:lnRef>
+          <a:fillRef idx="1">
+            <a:schemeClr val="accent1"/>
+          </a:fillRef>
+          <a:effectRef idx="0">
+            <a:schemeClr val="accent1"/>
+          </a:effectRef>
+          <a:fontRef idx="minor">
+            <a:schemeClr val="lt1"/>
+          </a:fontRef>
+        </p:style>
+        <p:txBody>
+          <a:bodyPr rtlCol="0" anchor="ctr"/>
+          <a:lstStyle/>
+          <a:p>
+            <a:pPr algn="ctr"/>
+            <a:r>
+              <a:rPr lang="pt-BR" dirty="0">
+                <a:solidFill>
+                  <a:schemeClr val="tx1"/>
+                </a:solidFill>
+              </a:rPr>
+              <a:t>File1.txt</a:t>
+            </a:r>
+          </a:p>
+        </p:txBody>
+      </p:sp>
+      <p:sp>
+        <p:nvSpPr>
+          <p:cNvPr id="31" name="Flowchart: Document 30">
+            <a:extLst>
+              <a:ext uri="{FF2B5EF4-FFF2-40B4-BE49-F238E27FC236}">
+                <a16:creationId xmlns:a16="http://schemas.microsoft.com/office/drawing/2014/main" id="{617F567C-3B21-4D9C-9AC0-86D7FFAE80AB}"/>
+              </a:ext>
+            </a:extLst>
+          </p:cNvPr>
+          <p:cNvSpPr/>
+          <p:nvPr/>
+        </p:nvSpPr>
+        <p:spPr>
+          <a:xfrm>
+            <a:off x="3240799" y="1432502"/>
+            <a:ext cx="1189822" cy="612648"/>
+          </a:xfrm>
+          <a:prstGeom prst="flowChartDocument">
+            <a:avLst/>
+          </a:prstGeom>
+        </p:spPr>
+        <p:style>
+          <a:lnRef idx="2">
+            <a:schemeClr val="accent1">
+              <a:shade val="50000"/>
+            </a:schemeClr>
+          </a:lnRef>
+          <a:fillRef idx="1">
+            <a:schemeClr val="accent1"/>
+          </a:fillRef>
+          <a:effectRef idx="0">
+            <a:schemeClr val="accent1"/>
+          </a:effectRef>
+          <a:fontRef idx="minor">
+            <a:schemeClr val="lt1"/>
+          </a:fontRef>
+        </p:style>
+        <p:txBody>
+          <a:bodyPr rtlCol="0" anchor="ctr"/>
+          <a:lstStyle/>
+          <a:p>
+            <a:pPr algn="ctr"/>
+            <a:r>
+              <a:rPr lang="pt-BR" dirty="0">
+                <a:solidFill>
+                  <a:schemeClr val="tx1"/>
+                </a:solidFill>
+              </a:rPr>
+              <a:t>File2.txt</a:t>
+            </a:r>
+          </a:p>
+        </p:txBody>
+      </p:sp>
+      <p:sp>
+        <p:nvSpPr>
+          <p:cNvPr id="32" name="Flowchart: Document 31">
+            <a:extLst>
+              <a:ext uri="{FF2B5EF4-FFF2-40B4-BE49-F238E27FC236}">
+                <a16:creationId xmlns:a16="http://schemas.microsoft.com/office/drawing/2014/main" id="{48574A88-56AA-40EC-8270-A736DB737052}"/>
+              </a:ext>
+            </a:extLst>
+          </p:cNvPr>
+          <p:cNvSpPr/>
+          <p:nvPr/>
+        </p:nvSpPr>
+        <p:spPr>
+          <a:xfrm>
+            <a:off x="3240799" y="2313854"/>
+            <a:ext cx="1189822" cy="612648"/>
+          </a:xfrm>
+          <a:prstGeom prst="flowChartDocument">
+            <a:avLst/>
+          </a:prstGeom>
+        </p:spPr>
+        <p:style>
+          <a:lnRef idx="2">
+            <a:schemeClr val="accent1">
+              <a:shade val="50000"/>
+            </a:schemeClr>
+          </a:lnRef>
+          <a:fillRef idx="1">
+            <a:schemeClr val="accent1"/>
+          </a:fillRef>
+          <a:effectRef idx="0">
+            <a:schemeClr val="accent1"/>
+          </a:effectRef>
+          <a:fontRef idx="minor">
+            <a:schemeClr val="lt1"/>
+          </a:fontRef>
+        </p:style>
+        <p:txBody>
+          <a:bodyPr rtlCol="0" anchor="ctr"/>
+          <a:lstStyle/>
+          <a:p>
+            <a:pPr algn="ctr"/>
+            <a:r>
+              <a:rPr lang="pt-BR" dirty="0">
+                <a:solidFill>
+                  <a:schemeClr val="tx1"/>
+                </a:solidFill>
+              </a:rPr>
+              <a:t>Image.txt</a:t>
+            </a:r>
+          </a:p>
+        </p:txBody>
+      </p:sp>
+      <p:sp>
+        <p:nvSpPr>
+          <p:cNvPr id="50" name="TextBox 49">
+            <a:extLst>
+              <a:ext uri="{FF2B5EF4-FFF2-40B4-BE49-F238E27FC236}">
+                <a16:creationId xmlns:a16="http://schemas.microsoft.com/office/drawing/2014/main" id="{4D30F2E3-A07B-4D34-9766-4E8830AF65F4}"/>
+              </a:ext>
+            </a:extLst>
+          </p:cNvPr>
+          <p:cNvSpPr txBox="1"/>
+          <p:nvPr/>
+        </p:nvSpPr>
+        <p:spPr>
+          <a:xfrm>
+            <a:off x="3271633" y="3117341"/>
+            <a:ext cx="917239" cy="646331"/>
+          </a:xfrm>
+          <a:prstGeom prst="rect">
+            <a:avLst/>
+          </a:prstGeom>
+          <a:noFill/>
+        </p:spPr>
+        <p:txBody>
+          <a:bodyPr wrap="none" rtlCol="0">
+            <a:spAutoFit/>
+          </a:bodyPr>
+          <a:lstStyle/>
+          <a:p>
+            <a:r>
+              <a:rPr lang="pt-BR" dirty="0"/>
+              <a:t>GITHUB</a:t>
+            </a:r>
+            <a:br>
+              <a:rPr lang="pt-BR" dirty="0"/>
+            </a:br>
+            <a:r>
+              <a:rPr lang="pt-BR" dirty="0"/>
+              <a:t>COOL</a:t>
+            </a:r>
+          </a:p>
+        </p:txBody>
+      </p:sp>
+    </p:spTree>
+    <p:extLst>
+      <p:ext uri="{BB962C8B-B14F-4D97-AF65-F5344CB8AC3E}">
+        <p14:creationId xmlns:p14="http://schemas.microsoft.com/office/powerpoint/2010/main" val="3701437090"/>
+      </p:ext>
+    </p:extLst>
+  </p:cSld>
+  <p:clrMapOvr>
+    <a:masterClrMapping/>
+  </p:clrMapOvr>
+</p:sld>
+</file>
+
 <file path=ppt/theme/theme1.xml><?xml version="1.0" encoding="utf-8"?>
 <a:theme xmlns:a="http://schemas.openxmlformats.org/drawingml/2006/main" name="Office Theme">
   <a:themeElements>

</xml_diff>

<commit_message>
Updates by sgiraldo @ 20191011 17:12
</commit_message>
<xml_diff>
--- a/Presentation1.pptx
+++ b/Presentation1.pptx
@@ -13,6 +13,7 @@
     <p:sldId id="264" r:id="rId7"/>
     <p:sldId id="263" r:id="rId8"/>
     <p:sldId id="265" r:id="rId9"/>
+    <p:sldId id="266" r:id="rId10"/>
   </p:sldIdLst>
   <p:sldSz cx="12192000" cy="6858000"/>
   <p:notesSz cx="6858000" cy="9144000"/>
@@ -10959,6 +10960,1425 @@
 </p:sld>
 </file>
 
+<file path=ppt/slides/slide9.xml><?xml version="1.0" encoding="utf-8"?>
+<p:sld xmlns:a="http://schemas.openxmlformats.org/drawingml/2006/main" xmlns:r="http://schemas.openxmlformats.org/officeDocument/2006/relationships" xmlns:p="http://schemas.openxmlformats.org/presentationml/2006/main">
+  <p:cSld>
+    <p:spTree>
+      <p:nvGrpSpPr>
+        <p:cNvPr id="1" name=""/>
+        <p:cNvGrpSpPr/>
+        <p:nvPr/>
+      </p:nvGrpSpPr>
+      <p:grpSpPr>
+        <a:xfrm>
+          <a:off x="0" y="0"/>
+          <a:ext cx="0" cy="0"/>
+          <a:chOff x="0" y="0"/>
+          <a:chExt cx="0" cy="0"/>
+        </a:xfrm>
+      </p:grpSpPr>
+      <p:sp>
+        <p:nvSpPr>
+          <p:cNvPr id="30" name="Flowchart: Document 29">
+            <a:extLst>
+              <a:ext uri="{FF2B5EF4-FFF2-40B4-BE49-F238E27FC236}">
+                <a16:creationId xmlns:a16="http://schemas.microsoft.com/office/drawing/2014/main" id="{27A42941-7360-498F-899E-15C8EE29A963}"/>
+              </a:ext>
+            </a:extLst>
+          </p:cNvPr>
+          <p:cNvSpPr/>
+          <p:nvPr/>
+        </p:nvSpPr>
+        <p:spPr>
+          <a:xfrm>
+            <a:off x="174433" y="551150"/>
+            <a:ext cx="1189822" cy="612648"/>
+          </a:xfrm>
+          <a:prstGeom prst="flowChartDocument">
+            <a:avLst/>
+          </a:prstGeom>
+        </p:spPr>
+        <p:style>
+          <a:lnRef idx="2">
+            <a:schemeClr val="accent1">
+              <a:shade val="50000"/>
+            </a:schemeClr>
+          </a:lnRef>
+          <a:fillRef idx="1">
+            <a:schemeClr val="accent1"/>
+          </a:fillRef>
+          <a:effectRef idx="0">
+            <a:schemeClr val="accent1"/>
+          </a:effectRef>
+          <a:fontRef idx="minor">
+            <a:schemeClr val="lt1"/>
+          </a:fontRef>
+        </p:style>
+        <p:txBody>
+          <a:bodyPr rtlCol="0" anchor="ctr"/>
+          <a:lstStyle/>
+          <a:p>
+            <a:pPr algn="ctr"/>
+            <a:r>
+              <a:rPr lang="pt-BR" dirty="0">
+                <a:solidFill>
+                  <a:schemeClr val="tx1"/>
+                </a:solidFill>
+              </a:rPr>
+              <a:t>File1.txt</a:t>
+            </a:r>
+          </a:p>
+        </p:txBody>
+      </p:sp>
+      <p:sp>
+        <p:nvSpPr>
+          <p:cNvPr id="33" name="Flowchart: Document 32">
+            <a:extLst>
+              <a:ext uri="{FF2B5EF4-FFF2-40B4-BE49-F238E27FC236}">
+                <a16:creationId xmlns:a16="http://schemas.microsoft.com/office/drawing/2014/main" id="{DA127300-D428-4422-93A3-B1669BA15600}"/>
+              </a:ext>
+            </a:extLst>
+          </p:cNvPr>
+          <p:cNvSpPr/>
+          <p:nvPr/>
+        </p:nvSpPr>
+        <p:spPr>
+          <a:xfrm>
+            <a:off x="174433" y="1432502"/>
+            <a:ext cx="1189822" cy="612648"/>
+          </a:xfrm>
+          <a:prstGeom prst="flowChartDocument">
+            <a:avLst/>
+          </a:prstGeom>
+        </p:spPr>
+        <p:style>
+          <a:lnRef idx="2">
+            <a:schemeClr val="accent1">
+              <a:shade val="50000"/>
+            </a:schemeClr>
+          </a:lnRef>
+          <a:fillRef idx="1">
+            <a:schemeClr val="accent1"/>
+          </a:fillRef>
+          <a:effectRef idx="0">
+            <a:schemeClr val="accent1"/>
+          </a:effectRef>
+          <a:fontRef idx="minor">
+            <a:schemeClr val="lt1"/>
+          </a:fontRef>
+        </p:style>
+        <p:txBody>
+          <a:bodyPr rtlCol="0" anchor="ctr"/>
+          <a:lstStyle/>
+          <a:p>
+            <a:pPr algn="ctr"/>
+            <a:r>
+              <a:rPr lang="pt-BR" dirty="0">
+                <a:solidFill>
+                  <a:schemeClr val="tx1"/>
+                </a:solidFill>
+              </a:rPr>
+              <a:t>File2.txt</a:t>
+            </a:r>
+          </a:p>
+        </p:txBody>
+      </p:sp>
+      <p:sp>
+        <p:nvSpPr>
+          <p:cNvPr id="34" name="TextBox 33">
+            <a:extLst>
+              <a:ext uri="{FF2B5EF4-FFF2-40B4-BE49-F238E27FC236}">
+                <a16:creationId xmlns:a16="http://schemas.microsoft.com/office/drawing/2014/main" id="{A57D2F62-C7FD-4143-95DB-6741EF88EFEA}"/>
+              </a:ext>
+            </a:extLst>
+          </p:cNvPr>
+          <p:cNvSpPr txBox="1"/>
+          <p:nvPr/>
+        </p:nvSpPr>
+        <p:spPr>
+          <a:xfrm>
+            <a:off x="158669" y="3117341"/>
+            <a:ext cx="1205586" cy="369332"/>
+          </a:xfrm>
+          <a:prstGeom prst="rect">
+            <a:avLst/>
+          </a:prstGeom>
+          <a:noFill/>
+        </p:spPr>
+        <p:txBody>
+          <a:bodyPr wrap="none" rtlCol="0">
+            <a:spAutoFit/>
+          </a:bodyPr>
+          <a:lstStyle/>
+          <a:p>
+            <a:r>
+              <a:rPr lang="pt-BR" dirty="0"/>
+              <a:t>VISIONARY</a:t>
+            </a:r>
+          </a:p>
+        </p:txBody>
+      </p:sp>
+      <p:sp>
+        <p:nvSpPr>
+          <p:cNvPr id="35" name="TextBox 34">
+            <a:extLst>
+              <a:ext uri="{FF2B5EF4-FFF2-40B4-BE49-F238E27FC236}">
+                <a16:creationId xmlns:a16="http://schemas.microsoft.com/office/drawing/2014/main" id="{ED21A39D-49E8-4466-9652-9BF3F371C503}"/>
+              </a:ext>
+            </a:extLst>
+          </p:cNvPr>
+          <p:cNvSpPr txBox="1"/>
+          <p:nvPr/>
+        </p:nvSpPr>
+        <p:spPr>
+          <a:xfrm>
+            <a:off x="1966049" y="3117341"/>
+            <a:ext cx="968535" cy="646331"/>
+          </a:xfrm>
+          <a:prstGeom prst="rect">
+            <a:avLst/>
+          </a:prstGeom>
+          <a:noFill/>
+        </p:spPr>
+        <p:txBody>
+          <a:bodyPr wrap="none" rtlCol="0">
+            <a:spAutoFit/>
+          </a:bodyPr>
+          <a:lstStyle/>
+          <a:p>
+            <a:r>
+              <a:rPr lang="pt-BR" dirty="0"/>
+              <a:t>GITHUB</a:t>
+            </a:r>
+            <a:br>
+              <a:rPr lang="pt-BR" dirty="0"/>
+            </a:br>
+            <a:r>
+              <a:rPr lang="pt-BR" dirty="0"/>
+              <a:t>MASTER</a:t>
+            </a:r>
+          </a:p>
+        </p:txBody>
+      </p:sp>
+      <p:cxnSp>
+        <p:nvCxnSpPr>
+          <p:cNvPr id="36" name="Straight Connector 35">
+            <a:extLst>
+              <a:ext uri="{FF2B5EF4-FFF2-40B4-BE49-F238E27FC236}">
+                <a16:creationId xmlns:a16="http://schemas.microsoft.com/office/drawing/2014/main" id="{E0B35E76-BCA7-415E-8E38-0B4EBEFE48ED}"/>
+              </a:ext>
+            </a:extLst>
+          </p:cNvPr>
+          <p:cNvCxnSpPr/>
+          <p:nvPr/>
+        </p:nvCxnSpPr>
+        <p:spPr>
+          <a:xfrm>
+            <a:off x="4570163" y="416803"/>
+            <a:ext cx="0" cy="2445744"/>
+          </a:xfrm>
+          <a:prstGeom prst="line">
+            <a:avLst/>
+          </a:prstGeom>
+          <a:ln w="34925">
+            <a:solidFill>
+              <a:schemeClr val="tx2"/>
+            </a:solidFill>
+          </a:ln>
+        </p:spPr>
+        <p:style>
+          <a:lnRef idx="1">
+            <a:schemeClr val="accent1"/>
+          </a:lnRef>
+          <a:fillRef idx="0">
+            <a:schemeClr val="accent1"/>
+          </a:fillRef>
+          <a:effectRef idx="0">
+            <a:schemeClr val="accent1"/>
+          </a:effectRef>
+          <a:fontRef idx="minor">
+            <a:schemeClr val="tx1"/>
+          </a:fontRef>
+        </p:style>
+      </p:cxnSp>
+      <p:sp>
+        <p:nvSpPr>
+          <p:cNvPr id="37" name="Rectangle: Rounded Corners 36">
+            <a:extLst>
+              <a:ext uri="{FF2B5EF4-FFF2-40B4-BE49-F238E27FC236}">
+                <a16:creationId xmlns:a16="http://schemas.microsoft.com/office/drawing/2014/main" id="{FBA4F5D3-8987-4446-B95A-DC10E42DEE2A}"/>
+              </a:ext>
+            </a:extLst>
+          </p:cNvPr>
+          <p:cNvSpPr/>
+          <p:nvPr/>
+        </p:nvSpPr>
+        <p:spPr>
+          <a:xfrm>
+            <a:off x="8617021" y="210027"/>
+            <a:ext cx="1454226" cy="826265"/>
+          </a:xfrm>
+          <a:prstGeom prst="roundRect">
+            <a:avLst/>
+          </a:prstGeom>
+        </p:spPr>
+        <p:style>
+          <a:lnRef idx="2">
+            <a:schemeClr val="accent1">
+              <a:shade val="50000"/>
+            </a:schemeClr>
+          </a:lnRef>
+          <a:fillRef idx="1">
+            <a:schemeClr val="accent1"/>
+          </a:fillRef>
+          <a:effectRef idx="0">
+            <a:schemeClr val="accent1"/>
+          </a:effectRef>
+          <a:fontRef idx="minor">
+            <a:schemeClr val="lt1"/>
+          </a:fontRef>
+        </p:style>
+        <p:txBody>
+          <a:bodyPr rtlCol="0" anchor="ctr"/>
+          <a:lstStyle/>
+          <a:p>
+            <a:pPr algn="ctr"/>
+            <a:r>
+              <a:rPr lang="pt-BR" dirty="0">
+                <a:solidFill>
+                  <a:schemeClr val="tx1"/>
+                </a:solidFill>
+              </a:rPr>
+              <a:t>MASTER</a:t>
+            </a:r>
+          </a:p>
+        </p:txBody>
+      </p:sp>
+      <p:sp>
+        <p:nvSpPr>
+          <p:cNvPr id="38" name="Rectangle: Rounded Corners 37">
+            <a:extLst>
+              <a:ext uri="{FF2B5EF4-FFF2-40B4-BE49-F238E27FC236}">
+                <a16:creationId xmlns:a16="http://schemas.microsoft.com/office/drawing/2014/main" id="{810B104A-B2C2-4A89-B692-FFA2239283C8}"/>
+              </a:ext>
+            </a:extLst>
+          </p:cNvPr>
+          <p:cNvSpPr/>
+          <p:nvPr/>
+        </p:nvSpPr>
+        <p:spPr>
+          <a:xfrm>
+            <a:off x="8617021" y="1590324"/>
+            <a:ext cx="1454226" cy="826265"/>
+          </a:xfrm>
+          <a:prstGeom prst="roundRect">
+            <a:avLst/>
+          </a:prstGeom>
+        </p:spPr>
+        <p:style>
+          <a:lnRef idx="2">
+            <a:schemeClr val="accent1">
+              <a:shade val="50000"/>
+            </a:schemeClr>
+          </a:lnRef>
+          <a:fillRef idx="1">
+            <a:schemeClr val="accent1"/>
+          </a:fillRef>
+          <a:effectRef idx="0">
+            <a:schemeClr val="accent1"/>
+          </a:effectRef>
+          <a:fontRef idx="minor">
+            <a:schemeClr val="lt1"/>
+          </a:fontRef>
+        </p:style>
+        <p:txBody>
+          <a:bodyPr rtlCol="0" anchor="ctr"/>
+          <a:lstStyle/>
+          <a:p>
+            <a:pPr algn="ctr"/>
+            <a:r>
+              <a:rPr lang="pt-BR" dirty="0">
+                <a:solidFill>
+                  <a:schemeClr val="tx1"/>
+                </a:solidFill>
+              </a:rPr>
+              <a:t>ORIGIN/</a:t>
+            </a:r>
+            <a:br>
+              <a:rPr lang="pt-BR" dirty="0">
+                <a:solidFill>
+                  <a:schemeClr val="tx1"/>
+                </a:solidFill>
+              </a:rPr>
+            </a:br>
+            <a:r>
+              <a:rPr lang="pt-BR" dirty="0">
+                <a:solidFill>
+                  <a:schemeClr val="tx1"/>
+                </a:solidFill>
+              </a:rPr>
+              <a:t>MASTER</a:t>
+            </a:r>
+          </a:p>
+        </p:txBody>
+      </p:sp>
+      <p:sp>
+        <p:nvSpPr>
+          <p:cNvPr id="39" name="Flowchart: Punched Tape 38">
+            <a:extLst>
+              <a:ext uri="{FF2B5EF4-FFF2-40B4-BE49-F238E27FC236}">
+                <a16:creationId xmlns:a16="http://schemas.microsoft.com/office/drawing/2014/main" id="{CFF1CB06-0515-4316-B7AC-BE2ADA3ED3FA}"/>
+              </a:ext>
+            </a:extLst>
+          </p:cNvPr>
+          <p:cNvSpPr/>
+          <p:nvPr/>
+        </p:nvSpPr>
+        <p:spPr>
+          <a:xfrm>
+            <a:off x="10620267" y="210027"/>
+            <a:ext cx="1454226" cy="826265"/>
+          </a:xfrm>
+          <a:prstGeom prst="flowChartPunchedTape">
+            <a:avLst/>
+          </a:prstGeom>
+        </p:spPr>
+        <p:style>
+          <a:lnRef idx="2">
+            <a:schemeClr val="accent1">
+              <a:shade val="50000"/>
+            </a:schemeClr>
+          </a:lnRef>
+          <a:fillRef idx="1">
+            <a:schemeClr val="accent1"/>
+          </a:fillRef>
+          <a:effectRef idx="0">
+            <a:schemeClr val="accent1"/>
+          </a:effectRef>
+          <a:fontRef idx="minor">
+            <a:schemeClr val="lt1"/>
+          </a:fontRef>
+        </p:style>
+        <p:txBody>
+          <a:bodyPr rtlCol="0" anchor="ctr"/>
+          <a:lstStyle/>
+          <a:p>
+            <a:pPr algn="ctr"/>
+            <a:r>
+              <a:rPr lang="pt-BR" dirty="0">
+                <a:solidFill>
+                  <a:schemeClr val="tx1"/>
+                </a:solidFill>
+              </a:rPr>
+              <a:t>HEAD</a:t>
+            </a:r>
+          </a:p>
+        </p:txBody>
+      </p:sp>
+      <p:cxnSp>
+        <p:nvCxnSpPr>
+          <p:cNvPr id="40" name="Straight Arrow Connector 39">
+            <a:extLst>
+              <a:ext uri="{FF2B5EF4-FFF2-40B4-BE49-F238E27FC236}">
+                <a16:creationId xmlns:a16="http://schemas.microsoft.com/office/drawing/2014/main" id="{F449FB8C-5E27-4E5F-ABAD-965B5DF69742}"/>
+              </a:ext>
+            </a:extLst>
+          </p:cNvPr>
+          <p:cNvCxnSpPr>
+            <a:cxnSpLocks/>
+            <a:stCxn id="39" idx="1"/>
+            <a:endCxn id="37" idx="3"/>
+          </p:cNvCxnSpPr>
+          <p:nvPr/>
+        </p:nvCxnSpPr>
+        <p:spPr>
+          <a:xfrm flipH="1">
+            <a:off x="10071247" y="623160"/>
+            <a:ext cx="549020" cy="0"/>
+          </a:xfrm>
+          <a:prstGeom prst="straightConnector1">
+            <a:avLst/>
+          </a:prstGeom>
+          <a:ln>
+            <a:tailEnd type="triangle"/>
+          </a:ln>
+        </p:spPr>
+        <p:style>
+          <a:lnRef idx="1">
+            <a:schemeClr val="accent1"/>
+          </a:lnRef>
+          <a:fillRef idx="0">
+            <a:schemeClr val="accent1"/>
+          </a:fillRef>
+          <a:effectRef idx="0">
+            <a:schemeClr val="accent1"/>
+          </a:effectRef>
+          <a:fontRef idx="minor">
+            <a:schemeClr val="tx1"/>
+          </a:fontRef>
+        </p:style>
+      </p:cxnSp>
+      <p:sp>
+        <p:nvSpPr>
+          <p:cNvPr id="42" name="Oval 41">
+            <a:extLst>
+              <a:ext uri="{FF2B5EF4-FFF2-40B4-BE49-F238E27FC236}">
+                <a16:creationId xmlns:a16="http://schemas.microsoft.com/office/drawing/2014/main" id="{EC0A4FE6-5057-4CE8-97CD-1A99A8754C8F}"/>
+              </a:ext>
+            </a:extLst>
+          </p:cNvPr>
+          <p:cNvSpPr/>
+          <p:nvPr/>
+        </p:nvSpPr>
+        <p:spPr>
+          <a:xfrm>
+            <a:off x="4674228" y="1037421"/>
+            <a:ext cx="1553378" cy="1134738"/>
+          </a:xfrm>
+          <a:prstGeom prst="ellipse">
+            <a:avLst/>
+          </a:prstGeom>
+        </p:spPr>
+        <p:style>
+          <a:lnRef idx="2">
+            <a:schemeClr val="accent1">
+              <a:shade val="50000"/>
+            </a:schemeClr>
+          </a:lnRef>
+          <a:fillRef idx="1">
+            <a:schemeClr val="accent1"/>
+          </a:fillRef>
+          <a:effectRef idx="0">
+            <a:schemeClr val="accent1"/>
+          </a:effectRef>
+          <a:fontRef idx="minor">
+            <a:schemeClr val="lt1"/>
+          </a:fontRef>
+        </p:style>
+        <p:txBody>
+          <a:bodyPr rtlCol="0" anchor="ctr"/>
+          <a:lstStyle/>
+          <a:p>
+            <a:pPr algn="ctr"/>
+            <a:r>
+              <a:rPr lang="pt-BR" dirty="0">
+                <a:solidFill>
+                  <a:schemeClr val="tx1"/>
+                </a:solidFill>
+              </a:rPr>
+              <a:t>93230ca</a:t>
+            </a:r>
+          </a:p>
+        </p:txBody>
+      </p:sp>
+      <p:sp>
+        <p:nvSpPr>
+          <p:cNvPr id="46" name="Oval 45">
+            <a:extLst>
+              <a:ext uri="{FF2B5EF4-FFF2-40B4-BE49-F238E27FC236}">
+                <a16:creationId xmlns:a16="http://schemas.microsoft.com/office/drawing/2014/main" id="{72B9499B-C4AF-4ABB-B820-43FFB4A0775C}"/>
+              </a:ext>
+            </a:extLst>
+          </p:cNvPr>
+          <p:cNvSpPr/>
+          <p:nvPr/>
+        </p:nvSpPr>
+        <p:spPr>
+          <a:xfrm>
+            <a:off x="6595445" y="1037421"/>
+            <a:ext cx="1553378" cy="1134738"/>
+          </a:xfrm>
+          <a:prstGeom prst="ellipse">
+            <a:avLst/>
+          </a:prstGeom>
+        </p:spPr>
+        <p:style>
+          <a:lnRef idx="2">
+            <a:schemeClr val="accent1">
+              <a:shade val="50000"/>
+            </a:schemeClr>
+          </a:lnRef>
+          <a:fillRef idx="1">
+            <a:schemeClr val="accent1"/>
+          </a:fillRef>
+          <a:effectRef idx="0">
+            <a:schemeClr val="accent1"/>
+          </a:effectRef>
+          <a:fontRef idx="minor">
+            <a:schemeClr val="lt1"/>
+          </a:fontRef>
+        </p:style>
+        <p:txBody>
+          <a:bodyPr rtlCol="0" anchor="ctr"/>
+          <a:lstStyle/>
+          <a:p>
+            <a:pPr algn="ctr"/>
+            <a:r>
+              <a:rPr lang="pt-BR" dirty="0">
+                <a:solidFill>
+                  <a:schemeClr val="tx1"/>
+                </a:solidFill>
+              </a:rPr>
+              <a:t>0bd7901</a:t>
+            </a:r>
+          </a:p>
+        </p:txBody>
+      </p:sp>
+      <p:cxnSp>
+        <p:nvCxnSpPr>
+          <p:cNvPr id="9" name="Straight Arrow Connector 8">
+            <a:extLst>
+              <a:ext uri="{FF2B5EF4-FFF2-40B4-BE49-F238E27FC236}">
+                <a16:creationId xmlns:a16="http://schemas.microsoft.com/office/drawing/2014/main" id="{86B46F3F-6B76-425F-8D2A-CDDEC4BB6471}"/>
+              </a:ext>
+            </a:extLst>
+          </p:cNvPr>
+          <p:cNvCxnSpPr>
+            <a:stCxn id="46" idx="2"/>
+            <a:endCxn id="42" idx="6"/>
+          </p:cNvCxnSpPr>
+          <p:nvPr/>
+        </p:nvCxnSpPr>
+        <p:spPr>
+          <a:xfrm flipH="1">
+            <a:off x="6227606" y="1604790"/>
+            <a:ext cx="367839" cy="0"/>
+          </a:xfrm>
+          <a:prstGeom prst="straightConnector1">
+            <a:avLst/>
+          </a:prstGeom>
+          <a:ln>
+            <a:tailEnd type="triangle"/>
+          </a:ln>
+        </p:spPr>
+        <p:style>
+          <a:lnRef idx="1">
+            <a:schemeClr val="accent1"/>
+          </a:lnRef>
+          <a:fillRef idx="0">
+            <a:schemeClr val="accent1"/>
+          </a:fillRef>
+          <a:effectRef idx="0">
+            <a:schemeClr val="accent1"/>
+          </a:effectRef>
+          <a:fontRef idx="minor">
+            <a:schemeClr val="tx1"/>
+          </a:fontRef>
+        </p:style>
+      </p:cxnSp>
+      <p:cxnSp>
+        <p:nvCxnSpPr>
+          <p:cNvPr id="47" name="Straight Arrow Connector 46">
+            <a:extLst>
+              <a:ext uri="{FF2B5EF4-FFF2-40B4-BE49-F238E27FC236}">
+                <a16:creationId xmlns:a16="http://schemas.microsoft.com/office/drawing/2014/main" id="{6590E505-0548-487B-95B7-5A5AF54E44BB}"/>
+              </a:ext>
+            </a:extLst>
+          </p:cNvPr>
+          <p:cNvCxnSpPr>
+            <a:cxnSpLocks/>
+            <a:stCxn id="38" idx="1"/>
+            <a:endCxn id="41" idx="7"/>
+          </p:cNvCxnSpPr>
+          <p:nvPr/>
+        </p:nvCxnSpPr>
+        <p:spPr>
+          <a:xfrm flipH="1">
+            <a:off x="7921336" y="2003457"/>
+            <a:ext cx="695685" cy="1638066"/>
+          </a:xfrm>
+          <a:prstGeom prst="straightConnector1">
+            <a:avLst/>
+          </a:prstGeom>
+          <a:ln>
+            <a:tailEnd type="triangle"/>
+          </a:ln>
+        </p:spPr>
+        <p:style>
+          <a:lnRef idx="1">
+            <a:schemeClr val="accent1"/>
+          </a:lnRef>
+          <a:fillRef idx="0">
+            <a:schemeClr val="accent1"/>
+          </a:fillRef>
+          <a:effectRef idx="0">
+            <a:schemeClr val="accent1"/>
+          </a:effectRef>
+          <a:fontRef idx="minor">
+            <a:schemeClr val="tx1"/>
+          </a:fontRef>
+        </p:style>
+      </p:cxnSp>
+      <p:cxnSp>
+        <p:nvCxnSpPr>
+          <p:cNvPr id="49" name="Straight Arrow Connector 48">
+            <a:extLst>
+              <a:ext uri="{FF2B5EF4-FFF2-40B4-BE49-F238E27FC236}">
+                <a16:creationId xmlns:a16="http://schemas.microsoft.com/office/drawing/2014/main" id="{2D4CBAC1-C287-410B-AE85-EB9997A23AC1}"/>
+              </a:ext>
+            </a:extLst>
+          </p:cNvPr>
+          <p:cNvCxnSpPr>
+            <a:cxnSpLocks/>
+            <a:stCxn id="37" idx="1"/>
+            <a:endCxn id="41" idx="7"/>
+          </p:cNvCxnSpPr>
+          <p:nvPr/>
+        </p:nvCxnSpPr>
+        <p:spPr>
+          <a:xfrm flipH="1">
+            <a:off x="7921336" y="623160"/>
+            <a:ext cx="695685" cy="3018363"/>
+          </a:xfrm>
+          <a:prstGeom prst="straightConnector1">
+            <a:avLst/>
+          </a:prstGeom>
+          <a:ln>
+            <a:tailEnd type="triangle"/>
+          </a:ln>
+        </p:spPr>
+        <p:style>
+          <a:lnRef idx="1">
+            <a:schemeClr val="accent1"/>
+          </a:lnRef>
+          <a:fillRef idx="0">
+            <a:schemeClr val="accent1"/>
+          </a:fillRef>
+          <a:effectRef idx="0">
+            <a:schemeClr val="accent1"/>
+          </a:effectRef>
+          <a:fontRef idx="minor">
+            <a:schemeClr val="tx1"/>
+          </a:fontRef>
+        </p:style>
+      </p:cxnSp>
+      <p:sp>
+        <p:nvSpPr>
+          <p:cNvPr id="41" name="Oval 40">
+            <a:extLst>
+              <a:ext uri="{FF2B5EF4-FFF2-40B4-BE49-F238E27FC236}">
+                <a16:creationId xmlns:a16="http://schemas.microsoft.com/office/drawing/2014/main" id="{A40A42F3-4714-4FCA-9AC2-5C7C848FCC6F}"/>
+              </a:ext>
+            </a:extLst>
+          </p:cNvPr>
+          <p:cNvSpPr/>
+          <p:nvPr/>
+        </p:nvSpPr>
+        <p:spPr>
+          <a:xfrm>
+            <a:off x="6595445" y="3475344"/>
+            <a:ext cx="1553378" cy="1134738"/>
+          </a:xfrm>
+          <a:prstGeom prst="ellipse">
+            <a:avLst/>
+          </a:prstGeom>
+        </p:spPr>
+        <p:style>
+          <a:lnRef idx="2">
+            <a:schemeClr val="accent1">
+              <a:shade val="50000"/>
+            </a:schemeClr>
+          </a:lnRef>
+          <a:fillRef idx="1">
+            <a:schemeClr val="accent1"/>
+          </a:fillRef>
+          <a:effectRef idx="0">
+            <a:schemeClr val="accent1"/>
+          </a:effectRef>
+          <a:fontRef idx="minor">
+            <a:schemeClr val="lt1"/>
+          </a:fontRef>
+        </p:style>
+        <p:txBody>
+          <a:bodyPr rtlCol="0" anchor="ctr"/>
+          <a:lstStyle/>
+          <a:p>
+            <a:pPr algn="ctr"/>
+            <a:r>
+              <a:rPr lang="pt-BR" dirty="0">
+                <a:solidFill>
+                  <a:schemeClr val="tx1"/>
+                </a:solidFill>
+              </a:rPr>
+              <a:t>c8e4675</a:t>
+            </a:r>
+          </a:p>
+        </p:txBody>
+      </p:sp>
+      <p:sp>
+        <p:nvSpPr>
+          <p:cNvPr id="43" name="Rectangle: Rounded Corners 42">
+            <a:extLst>
+              <a:ext uri="{FF2B5EF4-FFF2-40B4-BE49-F238E27FC236}">
+                <a16:creationId xmlns:a16="http://schemas.microsoft.com/office/drawing/2014/main" id="{7DB7A850-A5EB-48FA-B16F-293758E65113}"/>
+              </a:ext>
+            </a:extLst>
+          </p:cNvPr>
+          <p:cNvSpPr/>
+          <p:nvPr/>
+        </p:nvSpPr>
+        <p:spPr>
+          <a:xfrm>
+            <a:off x="8617021" y="3629580"/>
+            <a:ext cx="1454226" cy="826265"/>
+          </a:xfrm>
+          <a:prstGeom prst="roundRect">
+            <a:avLst/>
+          </a:prstGeom>
+        </p:spPr>
+        <p:style>
+          <a:lnRef idx="2">
+            <a:schemeClr val="accent1">
+              <a:shade val="50000"/>
+            </a:schemeClr>
+          </a:lnRef>
+          <a:fillRef idx="1">
+            <a:schemeClr val="accent1"/>
+          </a:fillRef>
+          <a:effectRef idx="0">
+            <a:schemeClr val="accent1"/>
+          </a:effectRef>
+          <a:fontRef idx="minor">
+            <a:schemeClr val="lt1"/>
+          </a:fontRef>
+        </p:style>
+        <p:txBody>
+          <a:bodyPr rtlCol="0" anchor="ctr"/>
+          <a:lstStyle/>
+          <a:p>
+            <a:pPr algn="ctr"/>
+            <a:r>
+              <a:rPr lang="pt-BR" dirty="0">
+                <a:solidFill>
+                  <a:schemeClr val="tx1"/>
+                </a:solidFill>
+              </a:rPr>
+              <a:t>COOL</a:t>
+            </a:r>
+          </a:p>
+        </p:txBody>
+      </p:sp>
+      <p:cxnSp>
+        <p:nvCxnSpPr>
+          <p:cNvPr id="3" name="Straight Arrow Connector 2">
+            <a:extLst>
+              <a:ext uri="{FF2B5EF4-FFF2-40B4-BE49-F238E27FC236}">
+                <a16:creationId xmlns:a16="http://schemas.microsoft.com/office/drawing/2014/main" id="{E3CD74D0-37B5-4F79-B3DE-5FE0E352C612}"/>
+              </a:ext>
+            </a:extLst>
+          </p:cNvPr>
+          <p:cNvCxnSpPr>
+            <a:cxnSpLocks/>
+            <a:stCxn id="41" idx="0"/>
+            <a:endCxn id="46" idx="4"/>
+          </p:cNvCxnSpPr>
+          <p:nvPr/>
+        </p:nvCxnSpPr>
+        <p:spPr>
+          <a:xfrm flipV="1">
+            <a:off x="7372134" y="2172159"/>
+            <a:ext cx="0" cy="1303185"/>
+          </a:xfrm>
+          <a:prstGeom prst="straightConnector1">
+            <a:avLst/>
+          </a:prstGeom>
+          <a:ln>
+            <a:tailEnd type="triangle"/>
+          </a:ln>
+        </p:spPr>
+        <p:style>
+          <a:lnRef idx="1">
+            <a:schemeClr val="accent1"/>
+          </a:lnRef>
+          <a:fillRef idx="0">
+            <a:schemeClr val="accent1"/>
+          </a:fillRef>
+          <a:effectRef idx="0">
+            <a:schemeClr val="accent1"/>
+          </a:effectRef>
+          <a:fontRef idx="minor">
+            <a:schemeClr val="tx1"/>
+          </a:fontRef>
+        </p:style>
+      </p:cxnSp>
+      <p:cxnSp>
+        <p:nvCxnSpPr>
+          <p:cNvPr id="6" name="Straight Arrow Connector 5">
+            <a:extLst>
+              <a:ext uri="{FF2B5EF4-FFF2-40B4-BE49-F238E27FC236}">
+                <a16:creationId xmlns:a16="http://schemas.microsoft.com/office/drawing/2014/main" id="{EB77E17E-EA3C-498E-8B4D-C5082A8F0541}"/>
+              </a:ext>
+            </a:extLst>
+          </p:cNvPr>
+          <p:cNvCxnSpPr>
+            <a:stCxn id="43" idx="1"/>
+            <a:endCxn id="41" idx="6"/>
+          </p:cNvCxnSpPr>
+          <p:nvPr/>
+        </p:nvCxnSpPr>
+        <p:spPr>
+          <a:xfrm flipH="1">
+            <a:off x="8148823" y="4042713"/>
+            <a:ext cx="468198" cy="0"/>
+          </a:xfrm>
+          <a:prstGeom prst="straightConnector1">
+            <a:avLst/>
+          </a:prstGeom>
+          <a:ln>
+            <a:tailEnd type="triangle"/>
+          </a:ln>
+        </p:spPr>
+        <p:style>
+          <a:lnRef idx="1">
+            <a:schemeClr val="accent1"/>
+          </a:lnRef>
+          <a:fillRef idx="0">
+            <a:schemeClr val="accent1"/>
+          </a:fillRef>
+          <a:effectRef idx="0">
+            <a:schemeClr val="accent1"/>
+          </a:effectRef>
+          <a:fontRef idx="minor">
+            <a:schemeClr val="tx1"/>
+          </a:fontRef>
+        </p:style>
+      </p:cxnSp>
+      <p:sp>
+        <p:nvSpPr>
+          <p:cNvPr id="48" name="Flowchart: Document 47">
+            <a:extLst>
+              <a:ext uri="{FF2B5EF4-FFF2-40B4-BE49-F238E27FC236}">
+                <a16:creationId xmlns:a16="http://schemas.microsoft.com/office/drawing/2014/main" id="{8A3B6A4D-5060-4C6E-A33E-E63B3ED69A8B}"/>
+              </a:ext>
+            </a:extLst>
+          </p:cNvPr>
+          <p:cNvSpPr/>
+          <p:nvPr/>
+        </p:nvSpPr>
+        <p:spPr>
+          <a:xfrm>
+            <a:off x="174433" y="2313854"/>
+            <a:ext cx="1189822" cy="612648"/>
+          </a:xfrm>
+          <a:prstGeom prst="flowChartDocument">
+            <a:avLst/>
+          </a:prstGeom>
+        </p:spPr>
+        <p:style>
+          <a:lnRef idx="2">
+            <a:schemeClr val="accent1">
+              <a:shade val="50000"/>
+            </a:schemeClr>
+          </a:lnRef>
+          <a:fillRef idx="1">
+            <a:schemeClr val="accent1"/>
+          </a:fillRef>
+          <a:effectRef idx="0">
+            <a:schemeClr val="accent1"/>
+          </a:effectRef>
+          <a:fontRef idx="minor">
+            <a:schemeClr val="lt1"/>
+          </a:fontRef>
+        </p:style>
+        <p:txBody>
+          <a:bodyPr rtlCol="0" anchor="ctr"/>
+          <a:lstStyle/>
+          <a:p>
+            <a:pPr algn="ctr"/>
+            <a:r>
+              <a:rPr lang="pt-BR" dirty="0">
+                <a:solidFill>
+                  <a:schemeClr val="tx1"/>
+                </a:solidFill>
+              </a:rPr>
+              <a:t>Image.txt</a:t>
+            </a:r>
+          </a:p>
+        </p:txBody>
+      </p:sp>
+      <p:sp>
+        <p:nvSpPr>
+          <p:cNvPr id="26" name="Rectangle: Rounded Corners 25">
+            <a:extLst>
+              <a:ext uri="{FF2B5EF4-FFF2-40B4-BE49-F238E27FC236}">
+                <a16:creationId xmlns:a16="http://schemas.microsoft.com/office/drawing/2014/main" id="{4E6ACF27-807C-4D7B-AA22-D52CFBC088E3}"/>
+              </a:ext>
+            </a:extLst>
+          </p:cNvPr>
+          <p:cNvSpPr/>
+          <p:nvPr/>
+        </p:nvSpPr>
+        <p:spPr>
+          <a:xfrm>
+            <a:off x="8584573" y="2570825"/>
+            <a:ext cx="1454226" cy="826265"/>
+          </a:xfrm>
+          <a:prstGeom prst="roundRect">
+            <a:avLst/>
+          </a:prstGeom>
+        </p:spPr>
+        <p:style>
+          <a:lnRef idx="2">
+            <a:schemeClr val="accent1">
+              <a:shade val="50000"/>
+            </a:schemeClr>
+          </a:lnRef>
+          <a:fillRef idx="1">
+            <a:schemeClr val="accent1"/>
+          </a:fillRef>
+          <a:effectRef idx="0">
+            <a:schemeClr val="accent1"/>
+          </a:effectRef>
+          <a:fontRef idx="minor">
+            <a:schemeClr val="lt1"/>
+          </a:fontRef>
+        </p:style>
+        <p:txBody>
+          <a:bodyPr rtlCol="0" anchor="ctr"/>
+          <a:lstStyle/>
+          <a:p>
+            <a:pPr algn="ctr"/>
+            <a:r>
+              <a:rPr lang="pt-BR" dirty="0">
+                <a:solidFill>
+                  <a:schemeClr val="tx1"/>
+                </a:solidFill>
+              </a:rPr>
+              <a:t>ORIGIN/</a:t>
+            </a:r>
+            <a:br>
+              <a:rPr lang="pt-BR" dirty="0">
+                <a:solidFill>
+                  <a:schemeClr val="tx1"/>
+                </a:solidFill>
+              </a:rPr>
+            </a:br>
+            <a:r>
+              <a:rPr lang="pt-BR" dirty="0">
+                <a:solidFill>
+                  <a:schemeClr val="tx1"/>
+                </a:solidFill>
+              </a:rPr>
+              <a:t>COOL</a:t>
+            </a:r>
+          </a:p>
+        </p:txBody>
+      </p:sp>
+      <p:cxnSp>
+        <p:nvCxnSpPr>
+          <p:cNvPr id="8" name="Straight Arrow Connector 7">
+            <a:extLst>
+              <a:ext uri="{FF2B5EF4-FFF2-40B4-BE49-F238E27FC236}">
+                <a16:creationId xmlns:a16="http://schemas.microsoft.com/office/drawing/2014/main" id="{5D19C799-F39C-47A0-9551-A50D2402429C}"/>
+              </a:ext>
+            </a:extLst>
+          </p:cNvPr>
+          <p:cNvCxnSpPr>
+            <a:stCxn id="26" idx="1"/>
+            <a:endCxn id="41" idx="7"/>
+          </p:cNvCxnSpPr>
+          <p:nvPr/>
+        </p:nvCxnSpPr>
+        <p:spPr>
+          <a:xfrm flipH="1">
+            <a:off x="7921336" y="2983958"/>
+            <a:ext cx="663237" cy="657565"/>
+          </a:xfrm>
+          <a:prstGeom prst="straightConnector1">
+            <a:avLst/>
+          </a:prstGeom>
+          <a:ln>
+            <a:tailEnd type="triangle"/>
+          </a:ln>
+        </p:spPr>
+        <p:style>
+          <a:lnRef idx="1">
+            <a:schemeClr val="accent1"/>
+          </a:lnRef>
+          <a:fillRef idx="0">
+            <a:schemeClr val="accent1"/>
+          </a:fillRef>
+          <a:effectRef idx="0">
+            <a:schemeClr val="accent1"/>
+          </a:effectRef>
+          <a:fontRef idx="minor">
+            <a:schemeClr val="tx1"/>
+          </a:fontRef>
+        </p:style>
+      </p:cxnSp>
+      <p:sp>
+        <p:nvSpPr>
+          <p:cNvPr id="29" name="Flowchart: Document 28">
+            <a:extLst>
+              <a:ext uri="{FF2B5EF4-FFF2-40B4-BE49-F238E27FC236}">
+                <a16:creationId xmlns:a16="http://schemas.microsoft.com/office/drawing/2014/main" id="{6A0BF4A4-645C-4C0E-8E1E-8443FE3647A1}"/>
+              </a:ext>
+            </a:extLst>
+          </p:cNvPr>
+          <p:cNvSpPr/>
+          <p:nvPr/>
+        </p:nvSpPr>
+        <p:spPr>
+          <a:xfrm>
+            <a:off x="3240799" y="551150"/>
+            <a:ext cx="1189822" cy="612648"/>
+          </a:xfrm>
+          <a:prstGeom prst="flowChartDocument">
+            <a:avLst/>
+          </a:prstGeom>
+        </p:spPr>
+        <p:style>
+          <a:lnRef idx="2">
+            <a:schemeClr val="accent1">
+              <a:shade val="50000"/>
+            </a:schemeClr>
+          </a:lnRef>
+          <a:fillRef idx="1">
+            <a:schemeClr val="accent1"/>
+          </a:fillRef>
+          <a:effectRef idx="0">
+            <a:schemeClr val="accent1"/>
+          </a:effectRef>
+          <a:fontRef idx="minor">
+            <a:schemeClr val="lt1"/>
+          </a:fontRef>
+        </p:style>
+        <p:txBody>
+          <a:bodyPr rtlCol="0" anchor="ctr"/>
+          <a:lstStyle/>
+          <a:p>
+            <a:pPr algn="ctr"/>
+            <a:r>
+              <a:rPr lang="pt-BR" dirty="0">
+                <a:solidFill>
+                  <a:schemeClr val="tx1"/>
+                </a:solidFill>
+              </a:rPr>
+              <a:t>File1.txt</a:t>
+            </a:r>
+          </a:p>
+        </p:txBody>
+      </p:sp>
+      <p:sp>
+        <p:nvSpPr>
+          <p:cNvPr id="31" name="Flowchart: Document 30">
+            <a:extLst>
+              <a:ext uri="{FF2B5EF4-FFF2-40B4-BE49-F238E27FC236}">
+                <a16:creationId xmlns:a16="http://schemas.microsoft.com/office/drawing/2014/main" id="{617F567C-3B21-4D9C-9AC0-86D7FFAE80AB}"/>
+              </a:ext>
+            </a:extLst>
+          </p:cNvPr>
+          <p:cNvSpPr/>
+          <p:nvPr/>
+        </p:nvSpPr>
+        <p:spPr>
+          <a:xfrm>
+            <a:off x="3240799" y="1432502"/>
+            <a:ext cx="1189822" cy="612648"/>
+          </a:xfrm>
+          <a:prstGeom prst="flowChartDocument">
+            <a:avLst/>
+          </a:prstGeom>
+        </p:spPr>
+        <p:style>
+          <a:lnRef idx="2">
+            <a:schemeClr val="accent1">
+              <a:shade val="50000"/>
+            </a:schemeClr>
+          </a:lnRef>
+          <a:fillRef idx="1">
+            <a:schemeClr val="accent1"/>
+          </a:fillRef>
+          <a:effectRef idx="0">
+            <a:schemeClr val="accent1"/>
+          </a:effectRef>
+          <a:fontRef idx="minor">
+            <a:schemeClr val="lt1"/>
+          </a:fontRef>
+        </p:style>
+        <p:txBody>
+          <a:bodyPr rtlCol="0" anchor="ctr"/>
+          <a:lstStyle/>
+          <a:p>
+            <a:pPr algn="ctr"/>
+            <a:r>
+              <a:rPr lang="pt-BR" dirty="0">
+                <a:solidFill>
+                  <a:schemeClr val="tx1"/>
+                </a:solidFill>
+              </a:rPr>
+              <a:t>File2.txt</a:t>
+            </a:r>
+          </a:p>
+        </p:txBody>
+      </p:sp>
+      <p:sp>
+        <p:nvSpPr>
+          <p:cNvPr id="32" name="Flowchart: Document 31">
+            <a:extLst>
+              <a:ext uri="{FF2B5EF4-FFF2-40B4-BE49-F238E27FC236}">
+                <a16:creationId xmlns:a16="http://schemas.microsoft.com/office/drawing/2014/main" id="{48574A88-56AA-40EC-8270-A736DB737052}"/>
+              </a:ext>
+            </a:extLst>
+          </p:cNvPr>
+          <p:cNvSpPr/>
+          <p:nvPr/>
+        </p:nvSpPr>
+        <p:spPr>
+          <a:xfrm>
+            <a:off x="3240799" y="2313854"/>
+            <a:ext cx="1189822" cy="612648"/>
+          </a:xfrm>
+          <a:prstGeom prst="flowChartDocument">
+            <a:avLst/>
+          </a:prstGeom>
+        </p:spPr>
+        <p:style>
+          <a:lnRef idx="2">
+            <a:schemeClr val="accent1">
+              <a:shade val="50000"/>
+            </a:schemeClr>
+          </a:lnRef>
+          <a:fillRef idx="1">
+            <a:schemeClr val="accent1"/>
+          </a:fillRef>
+          <a:effectRef idx="0">
+            <a:schemeClr val="accent1"/>
+          </a:effectRef>
+          <a:fontRef idx="minor">
+            <a:schemeClr val="lt1"/>
+          </a:fontRef>
+        </p:style>
+        <p:txBody>
+          <a:bodyPr rtlCol="0" anchor="ctr"/>
+          <a:lstStyle/>
+          <a:p>
+            <a:pPr algn="ctr"/>
+            <a:r>
+              <a:rPr lang="pt-BR" dirty="0">
+                <a:solidFill>
+                  <a:schemeClr val="tx1"/>
+                </a:solidFill>
+              </a:rPr>
+              <a:t>Image.txt</a:t>
+            </a:r>
+          </a:p>
+        </p:txBody>
+      </p:sp>
+      <p:sp>
+        <p:nvSpPr>
+          <p:cNvPr id="50" name="TextBox 49">
+            <a:extLst>
+              <a:ext uri="{FF2B5EF4-FFF2-40B4-BE49-F238E27FC236}">
+                <a16:creationId xmlns:a16="http://schemas.microsoft.com/office/drawing/2014/main" id="{4D30F2E3-A07B-4D34-9766-4E8830AF65F4}"/>
+              </a:ext>
+            </a:extLst>
+          </p:cNvPr>
+          <p:cNvSpPr txBox="1"/>
+          <p:nvPr/>
+        </p:nvSpPr>
+        <p:spPr>
+          <a:xfrm>
+            <a:off x="3271633" y="3117341"/>
+            <a:ext cx="917239" cy="646331"/>
+          </a:xfrm>
+          <a:prstGeom prst="rect">
+            <a:avLst/>
+          </a:prstGeom>
+          <a:noFill/>
+        </p:spPr>
+        <p:txBody>
+          <a:bodyPr wrap="none" rtlCol="0">
+            <a:spAutoFit/>
+          </a:bodyPr>
+          <a:lstStyle/>
+          <a:p>
+            <a:r>
+              <a:rPr lang="pt-BR" dirty="0"/>
+              <a:t>GITHUB</a:t>
+            </a:r>
+            <a:br>
+              <a:rPr lang="pt-BR" dirty="0"/>
+            </a:br>
+            <a:r>
+              <a:rPr lang="pt-BR" dirty="0"/>
+              <a:t>COOL</a:t>
+            </a:r>
+          </a:p>
+        </p:txBody>
+      </p:sp>
+      <p:sp>
+        <p:nvSpPr>
+          <p:cNvPr id="51" name="Flowchart: Document 50">
+            <a:extLst>
+              <a:ext uri="{FF2B5EF4-FFF2-40B4-BE49-F238E27FC236}">
+                <a16:creationId xmlns:a16="http://schemas.microsoft.com/office/drawing/2014/main" id="{DECDEA2D-3D31-42BC-93F6-341C035B9DE0}"/>
+              </a:ext>
+            </a:extLst>
+          </p:cNvPr>
+          <p:cNvSpPr/>
+          <p:nvPr/>
+        </p:nvSpPr>
+        <p:spPr>
+          <a:xfrm>
+            <a:off x="1806773" y="551150"/>
+            <a:ext cx="1189822" cy="612648"/>
+          </a:xfrm>
+          <a:prstGeom prst="flowChartDocument">
+            <a:avLst/>
+          </a:prstGeom>
+        </p:spPr>
+        <p:style>
+          <a:lnRef idx="2">
+            <a:schemeClr val="accent1">
+              <a:shade val="50000"/>
+            </a:schemeClr>
+          </a:lnRef>
+          <a:fillRef idx="1">
+            <a:schemeClr val="accent1"/>
+          </a:fillRef>
+          <a:effectRef idx="0">
+            <a:schemeClr val="accent1"/>
+          </a:effectRef>
+          <a:fontRef idx="minor">
+            <a:schemeClr val="lt1"/>
+          </a:fontRef>
+        </p:style>
+        <p:txBody>
+          <a:bodyPr rtlCol="0" anchor="ctr"/>
+          <a:lstStyle/>
+          <a:p>
+            <a:pPr algn="ctr"/>
+            <a:r>
+              <a:rPr lang="pt-BR" dirty="0">
+                <a:solidFill>
+                  <a:schemeClr val="tx1"/>
+                </a:solidFill>
+              </a:rPr>
+              <a:t>File1.txt</a:t>
+            </a:r>
+          </a:p>
+        </p:txBody>
+      </p:sp>
+      <p:sp>
+        <p:nvSpPr>
+          <p:cNvPr id="52" name="Flowchart: Document 51">
+            <a:extLst>
+              <a:ext uri="{FF2B5EF4-FFF2-40B4-BE49-F238E27FC236}">
+                <a16:creationId xmlns:a16="http://schemas.microsoft.com/office/drawing/2014/main" id="{BE3A4F21-9F83-4EE0-814A-96F4CB6E97C6}"/>
+              </a:ext>
+            </a:extLst>
+          </p:cNvPr>
+          <p:cNvSpPr/>
+          <p:nvPr/>
+        </p:nvSpPr>
+        <p:spPr>
+          <a:xfrm>
+            <a:off x="1806773" y="1432502"/>
+            <a:ext cx="1189822" cy="612648"/>
+          </a:xfrm>
+          <a:prstGeom prst="flowChartDocument">
+            <a:avLst/>
+          </a:prstGeom>
+        </p:spPr>
+        <p:style>
+          <a:lnRef idx="2">
+            <a:schemeClr val="accent1">
+              <a:shade val="50000"/>
+            </a:schemeClr>
+          </a:lnRef>
+          <a:fillRef idx="1">
+            <a:schemeClr val="accent1"/>
+          </a:fillRef>
+          <a:effectRef idx="0">
+            <a:schemeClr val="accent1"/>
+          </a:effectRef>
+          <a:fontRef idx="minor">
+            <a:schemeClr val="lt1"/>
+          </a:fontRef>
+        </p:style>
+        <p:txBody>
+          <a:bodyPr rtlCol="0" anchor="ctr"/>
+          <a:lstStyle/>
+          <a:p>
+            <a:pPr algn="ctr"/>
+            <a:r>
+              <a:rPr lang="pt-BR" dirty="0">
+                <a:solidFill>
+                  <a:schemeClr val="tx1"/>
+                </a:solidFill>
+              </a:rPr>
+              <a:t>File2.txt</a:t>
+            </a:r>
+          </a:p>
+        </p:txBody>
+      </p:sp>
+      <p:sp>
+        <p:nvSpPr>
+          <p:cNvPr id="53" name="Flowchart: Document 52">
+            <a:extLst>
+              <a:ext uri="{FF2B5EF4-FFF2-40B4-BE49-F238E27FC236}">
+                <a16:creationId xmlns:a16="http://schemas.microsoft.com/office/drawing/2014/main" id="{DF0A15D8-4794-47C6-AF56-1931D5975C2C}"/>
+              </a:ext>
+            </a:extLst>
+          </p:cNvPr>
+          <p:cNvSpPr/>
+          <p:nvPr/>
+        </p:nvSpPr>
+        <p:spPr>
+          <a:xfrm>
+            <a:off x="1806773" y="2313854"/>
+            <a:ext cx="1189822" cy="612648"/>
+          </a:xfrm>
+          <a:prstGeom prst="flowChartDocument">
+            <a:avLst/>
+          </a:prstGeom>
+        </p:spPr>
+        <p:style>
+          <a:lnRef idx="2">
+            <a:schemeClr val="accent1">
+              <a:shade val="50000"/>
+            </a:schemeClr>
+          </a:lnRef>
+          <a:fillRef idx="1">
+            <a:schemeClr val="accent1"/>
+          </a:fillRef>
+          <a:effectRef idx="0">
+            <a:schemeClr val="accent1"/>
+          </a:effectRef>
+          <a:fontRef idx="minor">
+            <a:schemeClr val="lt1"/>
+          </a:fontRef>
+        </p:style>
+        <p:txBody>
+          <a:bodyPr rtlCol="0" anchor="ctr"/>
+          <a:lstStyle/>
+          <a:p>
+            <a:pPr algn="ctr"/>
+            <a:r>
+              <a:rPr lang="pt-BR" dirty="0">
+                <a:solidFill>
+                  <a:schemeClr val="tx1"/>
+                </a:solidFill>
+              </a:rPr>
+              <a:t>Image.txt</a:t>
+            </a:r>
+          </a:p>
+        </p:txBody>
+      </p:sp>
+    </p:spTree>
+    <p:extLst>
+      <p:ext uri="{BB962C8B-B14F-4D97-AF65-F5344CB8AC3E}">
+        <p14:creationId xmlns:p14="http://schemas.microsoft.com/office/powerpoint/2010/main" val="439159682"/>
+      </p:ext>
+    </p:extLst>
+  </p:cSld>
+  <p:clrMapOvr>
+    <a:masterClrMapping/>
+  </p:clrMapOvr>
+</p:sld>
+</file>
+
 <file path=ppt/theme/theme1.xml><?xml version="1.0" encoding="utf-8"?>
 <a:theme xmlns:a="http://schemas.openxmlformats.org/drawingml/2006/main" name="Office Theme">
   <a:themeElements>

</xml_diff>